<commit_message>
Nova versão dos fluxogramas e PDF de TI
</commit_message>
<xml_diff>
--- a/links-externos/Fluxogramas/Fluxogramas_TI_Grupo01.pptx
+++ b/links-externos/Fluxogramas/Fluxogramas_TI_Grupo01.pptx
@@ -9,15 +9,16 @@
     <p:sldId id="278" r:id="rId3"/>
     <p:sldId id="279" r:id="rId4"/>
     <p:sldId id="282" r:id="rId5"/>
-    <p:sldId id="283" r:id="rId6"/>
+    <p:sldId id="294" r:id="rId6"/>
     <p:sldId id="274" r:id="rId7"/>
-    <p:sldId id="284" r:id="rId8"/>
-    <p:sldId id="285" r:id="rId9"/>
+    <p:sldId id="295" r:id="rId8"/>
+    <p:sldId id="296" r:id="rId9"/>
     <p:sldId id="286" r:id="rId10"/>
-    <p:sldId id="287" r:id="rId11"/>
-    <p:sldId id="288" r:id="rId12"/>
+    <p:sldId id="299" r:id="rId11"/>
+    <p:sldId id="300" r:id="rId12"/>
     <p:sldId id="290" r:id="rId13"/>
-    <p:sldId id="289" r:id="rId14"/>
+    <p:sldId id="301" r:id="rId14"/>
+    <p:sldId id="302" r:id="rId15"/>
   </p:sldIdLst>
   <p:sldSz cx="12192000" cy="6858000"/>
   <p:notesSz cx="6858000" cy="9144000"/>
@@ -116,6 +117,11 @@
       </a:defRPr>
     </a:lvl9pPr>
   </p:defaultTextStyle>
+  <p:extLst>
+    <p:ext uri="{EFAFB233-063F-42B5-8137-9DF3F51BA10A}">
+      <p15:sldGuideLst xmlns:p15="http://schemas.microsoft.com/office/powerpoint/2012/main"/>
+    </p:ext>
+  </p:extLst>
 </p:presentation>
 </file>
 
@@ -266,7 +272,7 @@
           <a:p>
             <a:fld id="{C15C3DC0-1313-4DC3-B11C-1939117B2C89}" type="datetimeFigureOut">
               <a:rPr lang="pt-BR" smtClean="0"/>
-              <a:t>13/11/2022</a:t>
+              <a:t>18/11/2022</a:t>
             </a:fld>
             <a:endParaRPr lang="pt-BR"/>
           </a:p>
@@ -464,7 +470,7 @@
           <a:p>
             <a:fld id="{C15C3DC0-1313-4DC3-B11C-1939117B2C89}" type="datetimeFigureOut">
               <a:rPr lang="pt-BR" smtClean="0"/>
-              <a:t>13/11/2022</a:t>
+              <a:t>18/11/2022</a:t>
             </a:fld>
             <a:endParaRPr lang="pt-BR"/>
           </a:p>
@@ -672,7 +678,7 @@
           <a:p>
             <a:fld id="{C15C3DC0-1313-4DC3-B11C-1939117B2C89}" type="datetimeFigureOut">
               <a:rPr lang="pt-BR" smtClean="0"/>
-              <a:t>13/11/2022</a:t>
+              <a:t>18/11/2022</a:t>
             </a:fld>
             <a:endParaRPr lang="pt-BR"/>
           </a:p>
@@ -870,7 +876,7 @@
           <a:p>
             <a:fld id="{C15C3DC0-1313-4DC3-B11C-1939117B2C89}" type="datetimeFigureOut">
               <a:rPr lang="pt-BR" smtClean="0"/>
-              <a:t>13/11/2022</a:t>
+              <a:t>18/11/2022</a:t>
             </a:fld>
             <a:endParaRPr lang="pt-BR"/>
           </a:p>
@@ -1145,7 +1151,7 @@
           <a:p>
             <a:fld id="{C15C3DC0-1313-4DC3-B11C-1939117B2C89}" type="datetimeFigureOut">
               <a:rPr lang="pt-BR" smtClean="0"/>
-              <a:t>13/11/2022</a:t>
+              <a:t>18/11/2022</a:t>
             </a:fld>
             <a:endParaRPr lang="pt-BR"/>
           </a:p>
@@ -1410,7 +1416,7 @@
           <a:p>
             <a:fld id="{C15C3DC0-1313-4DC3-B11C-1939117B2C89}" type="datetimeFigureOut">
               <a:rPr lang="pt-BR" smtClean="0"/>
-              <a:t>13/11/2022</a:t>
+              <a:t>18/11/2022</a:t>
             </a:fld>
             <a:endParaRPr lang="pt-BR"/>
           </a:p>
@@ -1822,7 +1828,7 @@
           <a:p>
             <a:fld id="{C15C3DC0-1313-4DC3-B11C-1939117B2C89}" type="datetimeFigureOut">
               <a:rPr lang="pt-BR" smtClean="0"/>
-              <a:t>13/11/2022</a:t>
+              <a:t>18/11/2022</a:t>
             </a:fld>
             <a:endParaRPr lang="pt-BR"/>
           </a:p>
@@ -1963,7 +1969,7 @@
           <a:p>
             <a:fld id="{C15C3DC0-1313-4DC3-B11C-1939117B2C89}" type="datetimeFigureOut">
               <a:rPr lang="pt-BR" smtClean="0"/>
-              <a:t>13/11/2022</a:t>
+              <a:t>18/11/2022</a:t>
             </a:fld>
             <a:endParaRPr lang="pt-BR"/>
           </a:p>
@@ -2076,7 +2082,7 @@
           <a:p>
             <a:fld id="{C15C3DC0-1313-4DC3-B11C-1939117B2C89}" type="datetimeFigureOut">
               <a:rPr lang="pt-BR" smtClean="0"/>
-              <a:t>13/11/2022</a:t>
+              <a:t>18/11/2022</a:t>
             </a:fld>
             <a:endParaRPr lang="pt-BR"/>
           </a:p>
@@ -2387,7 +2393,7 @@
           <a:p>
             <a:fld id="{C15C3DC0-1313-4DC3-B11C-1939117B2C89}" type="datetimeFigureOut">
               <a:rPr lang="pt-BR" smtClean="0"/>
-              <a:t>13/11/2022</a:t>
+              <a:t>18/11/2022</a:t>
             </a:fld>
             <a:endParaRPr lang="pt-BR"/>
           </a:p>
@@ -2675,7 +2681,7 @@
           <a:p>
             <a:fld id="{C15C3DC0-1313-4DC3-B11C-1939117B2C89}" type="datetimeFigureOut">
               <a:rPr lang="pt-BR" smtClean="0"/>
-              <a:t>13/11/2022</a:t>
+              <a:t>18/11/2022</a:t>
             </a:fld>
             <a:endParaRPr lang="pt-BR"/>
           </a:p>
@@ -2916,7 +2922,7 @@
           <a:p>
             <a:fld id="{C15C3DC0-1313-4DC3-B11C-1939117B2C89}" type="datetimeFigureOut">
               <a:rPr lang="pt-BR" smtClean="0"/>
-              <a:t>13/11/2022</a:t>
+              <a:t>18/11/2022</a:t>
             </a:fld>
             <a:endParaRPr lang="pt-BR"/>
           </a:p>
@@ -3871,7 +3877,7 @@
         </p:nvSpPr>
         <p:spPr>
           <a:xfrm>
-            <a:off x="8340738" y="1334765"/>
+            <a:off x="6286259" y="1326721"/>
             <a:ext cx="2718690" cy="634152"/>
           </a:xfrm>
         </p:spPr>
@@ -4099,8 +4105,8 @@
         </p:nvSpPr>
         <p:spPr>
           <a:xfrm>
-            <a:off x="1349671" y="622333"/>
-            <a:ext cx="4941749" cy="1645920"/>
+            <a:off x="1225941" y="678262"/>
+            <a:ext cx="4123825" cy="1645920"/>
           </a:xfrm>
         </p:spPr>
         <p:txBody>
@@ -4113,7 +4119,7 @@
               <a:buNone/>
             </a:pPr>
             <a:r>
-              <a:rPr lang="pt-BR" sz="3600" b="1" i="1" dirty="0">
+              <a:rPr lang="pt-BR" sz="3000" b="1" i="1" dirty="0">
                 <a:latin typeface="+mj-lt"/>
               </a:rPr>
               <a:t>Fluxograma de problemas</a:t>
@@ -4189,7 +4195,7 @@
         </p:nvCxnSpPr>
         <p:spPr>
           <a:xfrm>
-            <a:off x="7609490" y="819807"/>
+            <a:off x="5818012" y="870861"/>
             <a:ext cx="0" cy="1181657"/>
           </a:xfrm>
           <a:prstGeom prst="line">
@@ -4232,7 +4238,7 @@
         </p:nvSpPr>
         <p:spPr>
           <a:xfrm>
-            <a:off x="1338477" y="3311319"/>
+            <a:off x="618424" y="3094935"/>
             <a:ext cx="2632364" cy="523803"/>
           </a:xfrm>
           <a:prstGeom prst="rect">
@@ -4434,7 +4440,7 @@
         </p:nvSpPr>
         <p:spPr>
           <a:xfrm>
-            <a:off x="8887851" y="3311319"/>
+            <a:off x="6535565" y="3031920"/>
             <a:ext cx="2632364" cy="523803"/>
           </a:xfrm>
           <a:prstGeom prst="rect">
@@ -4622,10 +4628,10 @@
       </p:sp>
       <p:pic>
         <p:nvPicPr>
-          <p:cNvPr id="4" name="Espaço Reservado para Conteúdo 4" descr="Forma, Retângulo&#10;&#10;Descrição gerada automaticamente">
-            <a:extLst>
-              <a:ext uri="{FF2B5EF4-FFF2-40B4-BE49-F238E27FC236}">
-                <a16:creationId xmlns:a16="http://schemas.microsoft.com/office/drawing/2014/main" id="{68F0ED92-679D-51D7-3FB4-8FCDC4C4F85D}"/>
+          <p:cNvPr id="4" name="Imagem 3" descr="Diagrama&#10;&#10;Descrição gerada automaticamente">
+            <a:extLst>
+              <a:ext uri="{FF2B5EF4-FFF2-40B4-BE49-F238E27FC236}">
+                <a16:creationId xmlns:a16="http://schemas.microsoft.com/office/drawing/2014/main" id="{8778946B-B25A-CC37-5A32-48D2DCD81240}"/>
               </a:ext>
             </a:extLst>
           </p:cNvPr>
@@ -4648,18 +4654,215 @@
         </p:blipFill>
         <p:spPr>
           <a:xfrm>
-            <a:off x="427371" y="3903138"/>
-            <a:ext cx="11337258" cy="2577514"/>
+            <a:off x="154106" y="4090421"/>
+            <a:ext cx="11968065" cy="2089317"/>
           </a:xfrm>
           <a:prstGeom prst="rect">
             <a:avLst/>
           </a:prstGeom>
         </p:spPr>
       </p:pic>
+      <p:sp>
+        <p:nvSpPr>
+          <p:cNvPr id="5" name="Chave Direita 4">
+            <a:extLst>
+              <a:ext uri="{FF2B5EF4-FFF2-40B4-BE49-F238E27FC236}">
+                <a16:creationId xmlns:a16="http://schemas.microsoft.com/office/drawing/2014/main" id="{47B9CEBE-FC71-8F00-DBA5-46B215B7AF57}"/>
+              </a:ext>
+            </a:extLst>
+          </p:cNvPr>
+          <p:cNvSpPr/>
+          <p:nvPr/>
+        </p:nvSpPr>
+        <p:spPr>
+          <a:xfrm rot="16200000">
+            <a:off x="1660614" y="2568098"/>
+            <a:ext cx="398613" cy="2260322"/>
+          </a:xfrm>
+          <a:prstGeom prst="rightBrace">
+            <a:avLst/>
+          </a:prstGeom>
+          <a:ln>
+            <a:solidFill>
+              <a:schemeClr val="accent4"/>
+            </a:solidFill>
+          </a:ln>
+        </p:spPr>
+        <p:style>
+          <a:lnRef idx="1">
+            <a:schemeClr val="accent1"/>
+          </a:lnRef>
+          <a:fillRef idx="0">
+            <a:schemeClr val="accent1"/>
+          </a:fillRef>
+          <a:effectRef idx="0">
+            <a:schemeClr val="accent1"/>
+          </a:effectRef>
+          <a:fontRef idx="minor">
+            <a:schemeClr val="tx1"/>
+          </a:fontRef>
+        </p:style>
+        <p:txBody>
+          <a:bodyPr rtlCol="0" anchor="ctr"/>
+          <a:lstStyle/>
+          <a:p>
+            <a:pPr algn="ctr"/>
+            <a:endParaRPr lang="pt-BR"/>
+          </a:p>
+        </p:txBody>
+      </p:sp>
+      <p:sp>
+        <p:nvSpPr>
+          <p:cNvPr id="6" name="Chave Direita 5">
+            <a:extLst>
+              <a:ext uri="{FF2B5EF4-FFF2-40B4-BE49-F238E27FC236}">
+                <a16:creationId xmlns:a16="http://schemas.microsoft.com/office/drawing/2014/main" id="{DA023BCE-8C7F-28CB-AA56-B1DDB1FFD700}"/>
+              </a:ext>
+            </a:extLst>
+          </p:cNvPr>
+          <p:cNvSpPr/>
+          <p:nvPr/>
+        </p:nvSpPr>
+        <p:spPr>
+          <a:xfrm rot="16200000">
+            <a:off x="7522087" y="425301"/>
+            <a:ext cx="398613" cy="6459943"/>
+          </a:xfrm>
+          <a:prstGeom prst="rightBrace">
+            <a:avLst/>
+          </a:prstGeom>
+          <a:ln>
+            <a:solidFill>
+              <a:schemeClr val="accent4"/>
+            </a:solidFill>
+          </a:ln>
+        </p:spPr>
+        <p:style>
+          <a:lnRef idx="1">
+            <a:schemeClr val="accent1"/>
+          </a:lnRef>
+          <a:fillRef idx="0">
+            <a:schemeClr val="accent1"/>
+          </a:fillRef>
+          <a:effectRef idx="0">
+            <a:schemeClr val="accent1"/>
+          </a:effectRef>
+          <a:fontRef idx="minor">
+            <a:schemeClr val="tx1"/>
+          </a:fontRef>
+        </p:style>
+        <p:txBody>
+          <a:bodyPr rtlCol="0" anchor="ctr"/>
+          <a:lstStyle/>
+          <a:p>
+            <a:pPr algn="ctr"/>
+            <a:endParaRPr lang="pt-BR"/>
+          </a:p>
+        </p:txBody>
+      </p:sp>
+      <p:sp>
+        <p:nvSpPr>
+          <p:cNvPr id="7" name="Título 1">
+            <a:extLst>
+              <a:ext uri="{FF2B5EF4-FFF2-40B4-BE49-F238E27FC236}">
+                <a16:creationId xmlns:a16="http://schemas.microsoft.com/office/drawing/2014/main" id="{90012830-BDEF-E3E7-56D1-092BFB9D3A04}"/>
+              </a:ext>
+            </a:extLst>
+          </p:cNvPr>
+          <p:cNvSpPr txBox="1">
+            <a:spLocks/>
+          </p:cNvSpPr>
+          <p:nvPr/>
+        </p:nvSpPr>
+        <p:spPr>
+          <a:xfrm>
+            <a:off x="9992707" y="1326721"/>
+            <a:ext cx="1036526" cy="634152"/>
+          </a:xfrm>
+          <a:prstGeom prst="rect">
+            <a:avLst/>
+          </a:prstGeom>
+        </p:spPr>
+        <p:txBody>
+          <a:bodyPr vert="horz" lIns="91440" tIns="45720" rIns="91440" bIns="45720" rtlCol="0" anchor="ctr">
+            <a:normAutofit fontScale="82500" lnSpcReduction="20000"/>
+          </a:bodyPr>
+          <a:lstStyle>
+            <a:lvl1pPr algn="l" defTabSz="914400" rtl="0" eaLnBrk="1" latinLnBrk="0" hangingPunct="1">
+              <a:lnSpc>
+                <a:spcPct val="90000"/>
+              </a:lnSpc>
+              <a:spcBef>
+                <a:spcPct val="0"/>
+              </a:spcBef>
+              <a:buNone/>
+              <a:defRPr sz="4400" kern="1200">
+                <a:solidFill>
+                  <a:schemeClr val="tx1"/>
+                </a:solidFill>
+                <a:latin typeface="+mj-lt"/>
+                <a:ea typeface="+mj-ea"/>
+                <a:cs typeface="+mj-cs"/>
+              </a:defRPr>
+            </a:lvl1pPr>
+          </a:lstStyle>
+          <a:p>
+            <a:r>
+              <a:rPr lang="pt-BR" sz="3100" i="1" dirty="0"/>
+              <a:t>Raia 1</a:t>
+            </a:r>
+            <a:br>
+              <a:rPr lang="pt-BR" sz="2800" dirty="0"/>
+            </a:br>
+            <a:endParaRPr lang="pt-BR" sz="2800" dirty="0"/>
+          </a:p>
+        </p:txBody>
+      </p:sp>
+      <p:cxnSp>
+        <p:nvCxnSpPr>
+          <p:cNvPr id="8" name="Conector reto 7">
+            <a:extLst>
+              <a:ext uri="{FF2B5EF4-FFF2-40B4-BE49-F238E27FC236}">
+                <a16:creationId xmlns:a16="http://schemas.microsoft.com/office/drawing/2014/main" id="{3F9F69C9-2EF7-A431-4F3C-2FFFD395052B}"/>
+              </a:ext>
+            </a:extLst>
+          </p:cNvPr>
+          <p:cNvCxnSpPr/>
+          <p:nvPr/>
+        </p:nvCxnSpPr>
+        <p:spPr>
+          <a:xfrm>
+            <a:off x="9438290" y="830698"/>
+            <a:ext cx="0" cy="1181657"/>
+          </a:xfrm>
+          <a:prstGeom prst="line">
+            <a:avLst/>
+          </a:prstGeom>
+          <a:ln w="12700">
+            <a:solidFill>
+              <a:srgbClr val="FFC000"/>
+            </a:solidFill>
+          </a:ln>
+        </p:spPr>
+        <p:style>
+          <a:lnRef idx="1">
+            <a:schemeClr val="accent1"/>
+          </a:lnRef>
+          <a:fillRef idx="0">
+            <a:schemeClr val="accent1"/>
+          </a:fillRef>
+          <a:effectRef idx="0">
+            <a:schemeClr val="accent1"/>
+          </a:effectRef>
+          <a:fontRef idx="minor">
+            <a:schemeClr val="tx1"/>
+          </a:fontRef>
+        </p:style>
+      </p:cxnSp>
     </p:spTree>
     <p:extLst>
       <p:ext uri="{BB962C8B-B14F-4D97-AF65-F5344CB8AC3E}">
-        <p14:creationId xmlns:p14="http://schemas.microsoft.com/office/powerpoint/2010/main" val="1838509896"/>
+        <p14:creationId xmlns:p14="http://schemas.microsoft.com/office/powerpoint/2010/main" val="3075149166"/>
       </p:ext>
     </p:extLst>
   </p:cSld>
@@ -4855,6 +5058,45 @@
       </p:sp>
       <p:sp>
         <p:nvSpPr>
+          <p:cNvPr id="2" name="Título 1">
+            <a:extLst>
+              <a:ext uri="{FF2B5EF4-FFF2-40B4-BE49-F238E27FC236}">
+                <a16:creationId xmlns:a16="http://schemas.microsoft.com/office/drawing/2014/main" id="{BB1337E7-EC70-E4D3-6246-1A6E8698B26C}"/>
+              </a:ext>
+            </a:extLst>
+          </p:cNvPr>
+          <p:cNvSpPr>
+            <a:spLocks noGrp="1"/>
+          </p:cNvSpPr>
+          <p:nvPr>
+            <p:ph type="title"/>
+          </p:nvPr>
+        </p:nvSpPr>
+        <p:spPr>
+          <a:xfrm>
+            <a:off x="7005048" y="1326721"/>
+            <a:ext cx="1206222" cy="634152"/>
+          </a:xfrm>
+        </p:spPr>
+        <p:txBody>
+          <a:bodyPr>
+            <a:normAutofit fontScale="90000"/>
+          </a:bodyPr>
+          <a:lstStyle/>
+          <a:p>
+            <a:r>
+              <a:rPr lang="pt-BR" sz="3200" i="1" dirty="0"/>
+              <a:t>Nível 1</a:t>
+            </a:r>
+            <a:br>
+              <a:rPr lang="pt-BR" sz="2800" dirty="0"/>
+            </a:br>
+            <a:endParaRPr lang="pt-BR" sz="2800" dirty="0"/>
+          </a:p>
+        </p:txBody>
+      </p:sp>
+      <p:sp>
+        <p:nvSpPr>
           <p:cNvPr id="18" name="Rectangle 17">
             <a:extLst>
               <a:ext uri="{FF2B5EF4-FFF2-40B4-BE49-F238E27FC236}">
@@ -5060,8 +5302,8 @@
         </p:nvSpPr>
         <p:spPr>
           <a:xfrm>
-            <a:off x="1349671" y="622333"/>
-            <a:ext cx="4941749" cy="1645920"/>
+            <a:off x="1460064" y="678262"/>
+            <a:ext cx="4123825" cy="1645920"/>
           </a:xfrm>
         </p:spPr>
         <p:txBody>
@@ -5074,7 +5316,7 @@
               <a:buNone/>
             </a:pPr>
             <a:r>
-              <a:rPr lang="pt-BR" sz="3600" b="1" i="1" dirty="0">
+              <a:rPr lang="pt-BR" sz="3000" b="1" i="1" dirty="0">
                 <a:latin typeface="+mj-lt"/>
               </a:rPr>
               <a:t>Fluxograma de problemas</a:t>
@@ -5150,7 +5392,7 @@
         </p:nvCxnSpPr>
         <p:spPr>
           <a:xfrm>
-            <a:off x="7609490" y="819807"/>
+            <a:off x="6138138" y="870861"/>
             <a:ext cx="0" cy="1181657"/>
           </a:xfrm>
           <a:prstGeom prst="line">
@@ -5182,32 +5424,51 @@
           <p:cNvPr id="7" name="Título 1">
             <a:extLst>
               <a:ext uri="{FF2B5EF4-FFF2-40B4-BE49-F238E27FC236}">
-                <a16:creationId xmlns:a16="http://schemas.microsoft.com/office/drawing/2014/main" id="{DF0F2398-BB9C-B971-15FD-40AA191F6512}"/>
-              </a:ext>
-            </a:extLst>
-          </p:cNvPr>
-          <p:cNvSpPr>
-            <a:spLocks noGrp="1"/>
-          </p:cNvSpPr>
-          <p:nvPr>
-            <p:ph type="title"/>
-          </p:nvPr>
-        </p:nvSpPr>
-        <p:spPr>
-          <a:xfrm>
-            <a:off x="9017053" y="1409782"/>
-            <a:ext cx="1297248" cy="634152"/>
-          </a:xfrm>
-        </p:spPr>
-        <p:txBody>
-          <a:bodyPr>
-            <a:normAutofit fontScale="90000"/>
+                <a16:creationId xmlns:a16="http://schemas.microsoft.com/office/drawing/2014/main" id="{90012830-BDEF-E3E7-56D1-092BFB9D3A04}"/>
+              </a:ext>
+            </a:extLst>
+          </p:cNvPr>
+          <p:cNvSpPr txBox="1">
+            <a:spLocks/>
+          </p:cNvSpPr>
+          <p:nvPr/>
+        </p:nvSpPr>
+        <p:spPr>
+          <a:xfrm>
+            <a:off x="9790659" y="1326721"/>
+            <a:ext cx="1036526" cy="634152"/>
+          </a:xfrm>
+          <a:prstGeom prst="rect">
+            <a:avLst/>
+          </a:prstGeom>
+        </p:spPr>
+        <p:txBody>
+          <a:bodyPr vert="horz" lIns="91440" tIns="45720" rIns="91440" bIns="45720" rtlCol="0" anchor="ctr">
+            <a:normAutofit fontScale="82500" lnSpcReduction="20000"/>
           </a:bodyPr>
-          <a:lstStyle/>
+          <a:lstStyle>
+            <a:lvl1pPr algn="l" defTabSz="914400" rtl="0" eaLnBrk="1" latinLnBrk="0" hangingPunct="1">
+              <a:lnSpc>
+                <a:spcPct val="90000"/>
+              </a:lnSpc>
+              <a:spcBef>
+                <a:spcPct val="0"/>
+              </a:spcBef>
+              <a:buNone/>
+              <a:defRPr sz="4400" kern="1200">
+                <a:solidFill>
+                  <a:schemeClr val="tx1"/>
+                </a:solidFill>
+                <a:latin typeface="+mj-lt"/>
+                <a:ea typeface="+mj-ea"/>
+                <a:cs typeface="+mj-cs"/>
+              </a:defRPr>
+            </a:lvl1pPr>
+          </a:lstStyle>
           <a:p>
             <a:r>
-              <a:rPr lang="pt-BR" sz="3300" i="1" dirty="0"/>
-              <a:t>Nível 1</a:t>
+              <a:rPr lang="pt-BR" sz="3100" i="1" dirty="0"/>
+              <a:t>Raia 2</a:t>
             </a:r>
             <a:br>
               <a:rPr lang="pt-BR" sz="2800" dirty="0"/>
@@ -5216,12 +5477,53 @@
           </a:p>
         </p:txBody>
       </p:sp>
+      <p:cxnSp>
+        <p:nvCxnSpPr>
+          <p:cNvPr id="8" name="Conector reto 7">
+            <a:extLst>
+              <a:ext uri="{FF2B5EF4-FFF2-40B4-BE49-F238E27FC236}">
+                <a16:creationId xmlns:a16="http://schemas.microsoft.com/office/drawing/2014/main" id="{3F9F69C9-2EF7-A431-4F3C-2FFFD395052B}"/>
+              </a:ext>
+            </a:extLst>
+          </p:cNvPr>
+          <p:cNvCxnSpPr/>
+          <p:nvPr/>
+        </p:nvCxnSpPr>
+        <p:spPr>
+          <a:xfrm>
+            <a:off x="9027518" y="830698"/>
+            <a:ext cx="0" cy="1181657"/>
+          </a:xfrm>
+          <a:prstGeom prst="line">
+            <a:avLst/>
+          </a:prstGeom>
+          <a:ln w="12700">
+            <a:solidFill>
+              <a:srgbClr val="FFC000"/>
+            </a:solidFill>
+          </a:ln>
+        </p:spPr>
+        <p:style>
+          <a:lnRef idx="1">
+            <a:schemeClr val="accent1"/>
+          </a:lnRef>
+          <a:fillRef idx="0">
+            <a:schemeClr val="accent1"/>
+          </a:fillRef>
+          <a:effectRef idx="0">
+            <a:schemeClr val="accent1"/>
+          </a:effectRef>
+          <a:fontRef idx="minor">
+            <a:schemeClr val="tx1"/>
+          </a:fontRef>
+        </p:style>
+      </p:cxnSp>
       <p:pic>
         <p:nvPicPr>
-          <p:cNvPr id="8" name="Espaço Reservado para Conteúdo 4" descr="Diagrama&#10;&#10;Descrição gerada automaticamente">
-            <a:extLst>
-              <a:ext uri="{FF2B5EF4-FFF2-40B4-BE49-F238E27FC236}">
-                <a16:creationId xmlns:a16="http://schemas.microsoft.com/office/drawing/2014/main" id="{335D524B-395C-841A-5EC7-16892DA7A719}"/>
+          <p:cNvPr id="9" name="Espaço Reservado para Conteúdo 4">
+            <a:extLst>
+              <a:ext uri="{FF2B5EF4-FFF2-40B4-BE49-F238E27FC236}">
+                <a16:creationId xmlns:a16="http://schemas.microsoft.com/office/drawing/2014/main" id="{F7E31D67-AE34-F9A5-25B2-89ABE7A8B94C}"/>
               </a:ext>
             </a:extLst>
           </p:cNvPr>
@@ -5244,8 +5546,8 @@
         </p:blipFill>
         <p:spPr>
           <a:xfrm>
-            <a:off x="334049" y="2604324"/>
-            <a:ext cx="11523901" cy="4031431"/>
+            <a:off x="133728" y="2960178"/>
+            <a:ext cx="11924544" cy="3572223"/>
           </a:xfrm>
           <a:prstGeom prst="rect">
             <a:avLst/>
@@ -5255,7 +5557,7 @@
     </p:spTree>
     <p:extLst>
       <p:ext uri="{BB962C8B-B14F-4D97-AF65-F5344CB8AC3E}">
-        <p14:creationId xmlns:p14="http://schemas.microsoft.com/office/powerpoint/2010/main" val="1685850121"/>
+        <p14:creationId xmlns:p14="http://schemas.microsoft.com/office/powerpoint/2010/main" val="1643197124"/>
       </p:ext>
     </p:extLst>
   </p:cSld>
@@ -5719,10 +6021,10 @@
       </p:sp>
       <p:pic>
         <p:nvPicPr>
-          <p:cNvPr id="3" name="Espaço Reservado para Conteúdo 4" descr="Diagrama&#10;&#10;Descrição gerada automaticamente">
-            <a:extLst>
-              <a:ext uri="{FF2B5EF4-FFF2-40B4-BE49-F238E27FC236}">
-                <a16:creationId xmlns:a16="http://schemas.microsoft.com/office/drawing/2014/main" id="{F926989E-F6C1-77F3-A8DE-AB9B1D9A0538}"/>
+          <p:cNvPr id="4" name="Imagem 3">
+            <a:extLst>
+              <a:ext uri="{FF2B5EF4-FFF2-40B4-BE49-F238E27FC236}">
+                <a16:creationId xmlns:a16="http://schemas.microsoft.com/office/drawing/2014/main" id="{568C0FA9-157D-7814-71A2-83E3509BD2DD}"/>
               </a:ext>
             </a:extLst>
           </p:cNvPr>
@@ -5745,8 +6047,8 @@
         </p:blipFill>
         <p:spPr>
           <a:xfrm>
-            <a:off x="5628183" y="871065"/>
-            <a:ext cx="4068093" cy="5323677"/>
+            <a:off x="5601963" y="819546"/>
+            <a:ext cx="4120534" cy="5392304"/>
           </a:xfrm>
           <a:prstGeom prst="rect">
             <a:avLst/>
@@ -5952,6 +6254,45 @@
       </p:sp>
       <p:sp>
         <p:nvSpPr>
+          <p:cNvPr id="2" name="Título 1">
+            <a:extLst>
+              <a:ext uri="{FF2B5EF4-FFF2-40B4-BE49-F238E27FC236}">
+                <a16:creationId xmlns:a16="http://schemas.microsoft.com/office/drawing/2014/main" id="{BB1337E7-EC70-E4D3-6246-1A6E8698B26C}"/>
+              </a:ext>
+            </a:extLst>
+          </p:cNvPr>
+          <p:cNvSpPr>
+            <a:spLocks noGrp="1"/>
+          </p:cNvSpPr>
+          <p:nvPr>
+            <p:ph type="title"/>
+          </p:nvPr>
+        </p:nvSpPr>
+        <p:spPr>
+          <a:xfrm>
+            <a:off x="7005048" y="1326721"/>
+            <a:ext cx="1206222" cy="634152"/>
+          </a:xfrm>
+        </p:spPr>
+        <p:txBody>
+          <a:bodyPr>
+            <a:normAutofit fontScale="90000"/>
+          </a:bodyPr>
+          <a:lstStyle/>
+          <a:p>
+            <a:r>
+              <a:rPr lang="pt-BR" sz="3200" i="1" dirty="0"/>
+              <a:t>Nível 2</a:t>
+            </a:r>
+            <a:br>
+              <a:rPr lang="pt-BR" sz="2800" dirty="0"/>
+            </a:br>
+            <a:endParaRPr lang="pt-BR" sz="2800" dirty="0"/>
+          </a:p>
+        </p:txBody>
+      </p:sp>
+      <p:sp>
+        <p:nvSpPr>
           <p:cNvPr id="18" name="Rectangle 17">
             <a:extLst>
               <a:ext uri="{FF2B5EF4-FFF2-40B4-BE49-F238E27FC236}">
@@ -6157,8 +6498,8 @@
         </p:nvSpPr>
         <p:spPr>
           <a:xfrm>
-            <a:off x="1349671" y="622333"/>
-            <a:ext cx="4941749" cy="1645920"/>
+            <a:off x="1460064" y="678262"/>
+            <a:ext cx="4123825" cy="1645920"/>
           </a:xfrm>
         </p:spPr>
         <p:txBody>
@@ -6171,7 +6512,7 @@
               <a:buNone/>
             </a:pPr>
             <a:r>
-              <a:rPr lang="pt-BR" sz="3600" b="1" i="1" dirty="0">
+              <a:rPr lang="pt-BR" sz="3000" b="1" i="1" dirty="0">
                 <a:latin typeface="+mj-lt"/>
               </a:rPr>
               <a:t>Fluxograma de problemas</a:t>
@@ -6247,7 +6588,7 @@
         </p:nvCxnSpPr>
         <p:spPr>
           <a:xfrm>
-            <a:off x="7609490" y="819807"/>
+            <a:off x="6138138" y="870861"/>
             <a:ext cx="0" cy="1181657"/>
           </a:xfrm>
           <a:prstGeom prst="line">
@@ -6279,43 +6620,103 @@
           <p:cNvPr id="7" name="Título 1">
             <a:extLst>
               <a:ext uri="{FF2B5EF4-FFF2-40B4-BE49-F238E27FC236}">
-                <a16:creationId xmlns:a16="http://schemas.microsoft.com/office/drawing/2014/main" id="{DF0F2398-BB9C-B971-15FD-40AA191F6512}"/>
-              </a:ext>
-            </a:extLst>
-          </p:cNvPr>
-          <p:cNvSpPr>
-            <a:spLocks noGrp="1"/>
-          </p:cNvSpPr>
-          <p:nvPr>
-            <p:ph type="title"/>
-          </p:nvPr>
-        </p:nvSpPr>
-        <p:spPr>
-          <a:xfrm>
-            <a:off x="9017053" y="1409782"/>
-            <a:ext cx="1297248" cy="634152"/>
-          </a:xfrm>
-        </p:spPr>
-        <p:txBody>
-          <a:bodyPr>
-            <a:normAutofit fontScale="90000"/>
+                <a16:creationId xmlns:a16="http://schemas.microsoft.com/office/drawing/2014/main" id="{90012830-BDEF-E3E7-56D1-092BFB9D3A04}"/>
+              </a:ext>
+            </a:extLst>
+          </p:cNvPr>
+          <p:cNvSpPr txBox="1">
+            <a:spLocks/>
+          </p:cNvSpPr>
+          <p:nvPr/>
+        </p:nvSpPr>
+        <p:spPr>
+          <a:xfrm>
+            <a:off x="9790659" y="1184146"/>
+            <a:ext cx="1014189" cy="634152"/>
+          </a:xfrm>
+          <a:prstGeom prst="rect">
+            <a:avLst/>
+          </a:prstGeom>
+        </p:spPr>
+        <p:txBody>
+          <a:bodyPr vert="horz" lIns="91440" tIns="45720" rIns="91440" bIns="45720" rtlCol="0" anchor="ctr">
+            <a:normAutofit fontScale="82500" lnSpcReduction="10000"/>
           </a:bodyPr>
-          <a:lstStyle/>
+          <a:lstStyle>
+            <a:lvl1pPr algn="l" defTabSz="914400" rtl="0" eaLnBrk="1" latinLnBrk="0" hangingPunct="1">
+              <a:lnSpc>
+                <a:spcPct val="90000"/>
+              </a:lnSpc>
+              <a:spcBef>
+                <a:spcPct val="0"/>
+              </a:spcBef>
+              <a:buNone/>
+              <a:defRPr sz="4400" kern="1200">
+                <a:solidFill>
+                  <a:schemeClr val="tx1"/>
+                </a:solidFill>
+                <a:latin typeface="+mj-lt"/>
+                <a:ea typeface="+mj-ea"/>
+                <a:cs typeface="+mj-cs"/>
+              </a:defRPr>
+            </a:lvl1pPr>
+          </a:lstStyle>
           <a:p>
             <a:r>
-              <a:rPr lang="pt-BR" sz="3300" i="1" dirty="0"/>
-              <a:t>Nível 3</a:t>
+              <a:rPr lang="pt-BR" sz="3100" i="1" dirty="0"/>
+              <a:t>Raia 3</a:t>
             </a:r>
             <a:endParaRPr lang="pt-BR" sz="2800" dirty="0"/>
           </a:p>
         </p:txBody>
       </p:sp>
+      <p:cxnSp>
+        <p:nvCxnSpPr>
+          <p:cNvPr id="8" name="Conector reto 7">
+            <a:extLst>
+              <a:ext uri="{FF2B5EF4-FFF2-40B4-BE49-F238E27FC236}">
+                <a16:creationId xmlns:a16="http://schemas.microsoft.com/office/drawing/2014/main" id="{3F9F69C9-2EF7-A431-4F3C-2FFFD395052B}"/>
+              </a:ext>
+            </a:extLst>
+          </p:cNvPr>
+          <p:cNvCxnSpPr/>
+          <p:nvPr/>
+        </p:nvCxnSpPr>
+        <p:spPr>
+          <a:xfrm>
+            <a:off x="9027518" y="830698"/>
+            <a:ext cx="0" cy="1181657"/>
+          </a:xfrm>
+          <a:prstGeom prst="line">
+            <a:avLst/>
+          </a:prstGeom>
+          <a:ln w="12700">
+            <a:solidFill>
+              <a:srgbClr val="FFC000"/>
+            </a:solidFill>
+          </a:ln>
+        </p:spPr>
+        <p:style>
+          <a:lnRef idx="1">
+            <a:schemeClr val="accent1"/>
+          </a:lnRef>
+          <a:fillRef idx="0">
+            <a:schemeClr val="accent1"/>
+          </a:fillRef>
+          <a:effectRef idx="0">
+            <a:schemeClr val="accent1"/>
+          </a:effectRef>
+          <a:fontRef idx="minor">
+            <a:schemeClr val="tx1"/>
+          </a:fontRef>
+        </p:style>
+      </p:cxnSp>
       <p:pic>
         <p:nvPicPr>
-          <p:cNvPr id="4" name="Espaço Reservado para Conteúdo 4" descr="Diagrama&#10;&#10;Descrição gerada automaticamente">
-            <a:extLst>
-              <a:ext uri="{FF2B5EF4-FFF2-40B4-BE49-F238E27FC236}">
-                <a16:creationId xmlns:a16="http://schemas.microsoft.com/office/drawing/2014/main" id="{F840F269-C3E4-22C7-8D1B-706BE7E6D0FA}"/>
+          <p:cNvPr id="4" name="Imagem 3">
+            <a:extLst>
+              <a:ext uri="{FF2B5EF4-FFF2-40B4-BE49-F238E27FC236}">
+                <a16:creationId xmlns:a16="http://schemas.microsoft.com/office/drawing/2014/main" id="{EE8FD197-C1AF-1AE1-B10E-CD2211ADB615}"/>
               </a:ext>
             </a:extLst>
           </p:cNvPr>
@@ -6332,13 +6733,13 @@
               </a:ext>
             </a:extLst>
           </a:blip>
-          <a:srcRect t="2336" b="12322"/>
+          <a:srcRect b="20646"/>
           <a:stretch/>
         </p:blipFill>
         <p:spPr>
           <a:xfrm>
-            <a:off x="1180591" y="2604324"/>
-            <a:ext cx="10221658" cy="4017708"/>
+            <a:off x="96960" y="2558254"/>
+            <a:ext cx="11998080" cy="4233798"/>
           </a:xfrm>
           <a:prstGeom prst="rect">
             <a:avLst/>
@@ -6348,7 +6749,698 @@
     </p:spTree>
     <p:extLst>
       <p:ext uri="{BB962C8B-B14F-4D97-AF65-F5344CB8AC3E}">
-        <p14:creationId xmlns:p14="http://schemas.microsoft.com/office/powerpoint/2010/main" val="1321052486"/>
+        <p14:creationId xmlns:p14="http://schemas.microsoft.com/office/powerpoint/2010/main" val="146953761"/>
+      </p:ext>
+    </p:extLst>
+  </p:cSld>
+  <p:clrMapOvr>
+    <a:masterClrMapping/>
+  </p:clrMapOvr>
+</p:sld>
+</file>
+
+<file path=ppt/slides/slide14.xml><?xml version="1.0" encoding="utf-8"?>
+<p:sld xmlns:a="http://schemas.openxmlformats.org/drawingml/2006/main" xmlns:r="http://schemas.openxmlformats.org/officeDocument/2006/relationships" xmlns:p="http://schemas.openxmlformats.org/presentationml/2006/main">
+  <p:cSld>
+    <p:bg>
+      <p:bgPr>
+        <a:solidFill>
+          <a:schemeClr val="bg1"/>
+        </a:solidFill>
+        <a:effectLst/>
+      </p:bgPr>
+    </p:bg>
+    <p:spTree>
+      <p:nvGrpSpPr>
+        <p:cNvPr id="1" name=""/>
+        <p:cNvGrpSpPr/>
+        <p:nvPr/>
+      </p:nvGrpSpPr>
+      <p:grpSpPr>
+        <a:xfrm>
+          <a:off x="0" y="0"/>
+          <a:ext cx="0" cy="0"/>
+          <a:chOff x="0" y="0"/>
+          <a:chExt cx="0" cy="0"/>
+        </a:xfrm>
+      </p:grpSpPr>
+      <p:sp useBgFill="1">
+        <p:nvSpPr>
+          <p:cNvPr id="14" name="Rectangle 13">
+            <a:extLst>
+              <a:ext uri="{FF2B5EF4-FFF2-40B4-BE49-F238E27FC236}">
+                <a16:creationId xmlns:a16="http://schemas.microsoft.com/office/drawing/2014/main" id="{2550BE34-C2B8-49B8-8519-67A8CAD51AE9}"/>
+              </a:ext>
+              <a:ext uri="{C183D7F6-B498-43B3-948B-1728B52AA6E4}">
+                <adec:decorative xmlns:adec="http://schemas.microsoft.com/office/drawing/2017/decorative" val="1"/>
+              </a:ext>
+            </a:extLst>
+          </p:cNvPr>
+          <p:cNvSpPr>
+            <a:spLocks noGrp="1" noRot="1" noChangeAspect="1" noMove="1" noResize="1" noEditPoints="1" noAdjustHandles="1" noChangeArrowheads="1" noChangeShapeType="1" noTextEdit="1"/>
+          </p:cNvSpPr>
+          <p:nvPr>
+            <p:extLst>
+              <p:ext uri="{386F3935-93C4-4BCD-93E2-E3B085C9AB24}">
+                <p16:designElem xmlns:p16="http://schemas.microsoft.com/office/powerpoint/2015/main" val="1"/>
+              </p:ext>
+            </p:extLst>
+          </p:nvPr>
+        </p:nvSpPr>
+        <p:spPr>
+          <a:xfrm>
+            <a:off x="0" y="0"/>
+            <a:ext cx="12192000" cy="6858000"/>
+          </a:xfrm>
+          <a:prstGeom prst="rect">
+            <a:avLst/>
+          </a:prstGeom>
+          <a:ln>
+            <a:noFill/>
+          </a:ln>
+        </p:spPr>
+        <p:style>
+          <a:lnRef idx="2">
+            <a:schemeClr val="accent1">
+              <a:shade val="50000"/>
+            </a:schemeClr>
+          </a:lnRef>
+          <a:fillRef idx="1">
+            <a:schemeClr val="accent1"/>
+          </a:fillRef>
+          <a:effectRef idx="0">
+            <a:schemeClr val="accent1"/>
+          </a:effectRef>
+          <a:fontRef idx="minor">
+            <a:schemeClr val="lt1"/>
+          </a:fontRef>
+        </p:style>
+        <p:txBody>
+          <a:bodyPr rtlCol="0" anchor="ctr"/>
+          <a:lstStyle/>
+          <a:p>
+            <a:pPr algn="ctr"/>
+            <a:endParaRPr lang="en-US"/>
+          </a:p>
+        </p:txBody>
+      </p:sp>
+      <p:sp useBgFill="1">
+        <p:nvSpPr>
+          <p:cNvPr id="16" name="Rectangle 15">
+            <a:extLst>
+              <a:ext uri="{FF2B5EF4-FFF2-40B4-BE49-F238E27FC236}">
+                <a16:creationId xmlns:a16="http://schemas.microsoft.com/office/drawing/2014/main" id="{A7457DD9-5A45-400A-AB4B-4B4EDECA25F1}"/>
+              </a:ext>
+              <a:ext uri="{C183D7F6-B498-43B3-948B-1728B52AA6E4}">
+                <adec:decorative xmlns:adec="http://schemas.microsoft.com/office/drawing/2017/decorative" val="1"/>
+              </a:ext>
+            </a:extLst>
+          </p:cNvPr>
+          <p:cNvSpPr>
+            <a:spLocks noGrp="1" noRot="1" noChangeAspect="1" noMove="1" noResize="1" noEditPoints="1" noAdjustHandles="1" noChangeArrowheads="1" noChangeShapeType="1" noTextEdit="1"/>
+          </p:cNvSpPr>
+          <p:nvPr>
+            <p:extLst>
+              <p:ext uri="{386F3935-93C4-4BCD-93E2-E3B085C9AB24}">
+                <p16:designElem xmlns:p16="http://schemas.microsoft.com/office/powerpoint/2015/main" val="1"/>
+              </p:ext>
+            </p:extLst>
+          </p:nvPr>
+        </p:nvSpPr>
+        <p:spPr>
+          <a:xfrm>
+            <a:off x="554416" y="365125"/>
+            <a:ext cx="11167447" cy="2089317"/>
+          </a:xfrm>
+          <a:prstGeom prst="rect">
+            <a:avLst/>
+          </a:prstGeom>
+          <a:ln w="12700">
+            <a:solidFill>
+              <a:srgbClr val="DEDEDE"/>
+            </a:solidFill>
+          </a:ln>
+          <a:effectLst>
+            <a:outerShdw blurRad="50800" dist="38100" dir="2700000" algn="tl" rotWithShape="0">
+              <a:schemeClr val="bg2">
+                <a:lumMod val="85000"/>
+                <a:alpha val="50000"/>
+              </a:schemeClr>
+            </a:outerShdw>
+          </a:effectLst>
+        </p:spPr>
+        <p:style>
+          <a:lnRef idx="2">
+            <a:schemeClr val="accent1">
+              <a:shade val="50000"/>
+            </a:schemeClr>
+          </a:lnRef>
+          <a:fillRef idx="1">
+            <a:schemeClr val="accent1"/>
+          </a:fillRef>
+          <a:effectRef idx="0">
+            <a:schemeClr val="accent1"/>
+          </a:effectRef>
+          <a:fontRef idx="minor">
+            <a:schemeClr val="lt1"/>
+          </a:fontRef>
+        </p:style>
+        <p:txBody>
+          <a:bodyPr rtlCol="0" anchor="ctr"/>
+          <a:lstStyle/>
+          <a:p>
+            <a:pPr marL="0" marR="0" lvl="0" indent="0" algn="ctr" defTabSz="914400" rtl="0" eaLnBrk="1" fontAlgn="auto" latinLnBrk="0" hangingPunct="1">
+              <a:lnSpc>
+                <a:spcPct val="100000"/>
+              </a:lnSpc>
+              <a:spcBef>
+                <a:spcPts val="0"/>
+              </a:spcBef>
+              <a:spcAft>
+                <a:spcPts val="0"/>
+              </a:spcAft>
+              <a:buClrTx/>
+              <a:buSzTx/>
+              <a:buFontTx/>
+              <a:buNone/>
+              <a:tabLst/>
+              <a:defRPr/>
+            </a:pPr>
+            <a:endParaRPr kumimoji="0" lang="en-US" sz="1800" b="0" i="0" u="none" strike="noStrike" kern="1200" cap="none" spc="0" normalizeH="0" baseline="0" noProof="0">
+              <a:ln>
+                <a:noFill/>
+              </a:ln>
+              <a:solidFill>
+                <a:prstClr val="white"/>
+              </a:solidFill>
+              <a:effectLst/>
+              <a:uLnTx/>
+              <a:uFillTx/>
+              <a:latin typeface="Calibri" panose="020F0502020204030204"/>
+              <a:ea typeface="+mn-ea"/>
+              <a:cs typeface="+mn-cs"/>
+            </a:endParaRPr>
+          </a:p>
+        </p:txBody>
+      </p:sp>
+      <p:sp>
+        <p:nvSpPr>
+          <p:cNvPr id="2" name="Título 1">
+            <a:extLst>
+              <a:ext uri="{FF2B5EF4-FFF2-40B4-BE49-F238E27FC236}">
+                <a16:creationId xmlns:a16="http://schemas.microsoft.com/office/drawing/2014/main" id="{BB1337E7-EC70-E4D3-6246-1A6E8698B26C}"/>
+              </a:ext>
+            </a:extLst>
+          </p:cNvPr>
+          <p:cNvSpPr>
+            <a:spLocks noGrp="1"/>
+          </p:cNvSpPr>
+          <p:nvPr>
+            <p:ph type="title"/>
+          </p:nvPr>
+        </p:nvSpPr>
+        <p:spPr>
+          <a:xfrm>
+            <a:off x="7005048" y="1326721"/>
+            <a:ext cx="1206222" cy="634152"/>
+          </a:xfrm>
+        </p:spPr>
+        <p:txBody>
+          <a:bodyPr>
+            <a:normAutofit fontScale="90000"/>
+          </a:bodyPr>
+          <a:lstStyle/>
+          <a:p>
+            <a:r>
+              <a:rPr lang="pt-BR" sz="3200" i="1" dirty="0"/>
+              <a:t>Nível 3</a:t>
+            </a:r>
+            <a:br>
+              <a:rPr lang="pt-BR" sz="2800" dirty="0"/>
+            </a:br>
+            <a:endParaRPr lang="pt-BR" sz="2800" dirty="0"/>
+          </a:p>
+        </p:txBody>
+      </p:sp>
+      <p:sp>
+        <p:nvSpPr>
+          <p:cNvPr id="18" name="Rectangle 17">
+            <a:extLst>
+              <a:ext uri="{FF2B5EF4-FFF2-40B4-BE49-F238E27FC236}">
+                <a16:creationId xmlns:a16="http://schemas.microsoft.com/office/drawing/2014/main" id="{441CF7D6-A660-431A-B0BB-140A0D5556B6}"/>
+              </a:ext>
+              <a:ext uri="{C183D7F6-B498-43B3-948B-1728B52AA6E4}">
+                <adec:decorative xmlns:adec="http://schemas.microsoft.com/office/drawing/2017/decorative" val="1"/>
+              </a:ext>
+            </a:extLst>
+          </p:cNvPr>
+          <p:cNvSpPr>
+            <a:spLocks noGrp="1" noRot="1" noChangeAspect="1" noMove="1" noResize="1" noEditPoints="1" noAdjustHandles="1" noChangeArrowheads="1" noChangeShapeType="1" noTextEdit="1"/>
+          </p:cNvSpPr>
+          <p:nvPr>
+            <p:extLst>
+              <p:ext uri="{386F3935-93C4-4BCD-93E2-E3B085C9AB24}">
+                <p16:designElem xmlns:p16="http://schemas.microsoft.com/office/powerpoint/2015/main" val="1"/>
+              </p:ext>
+            </p:extLst>
+          </p:nvPr>
+        </p:nvSpPr>
+        <p:spPr>
+          <a:xfrm>
+            <a:off x="490408" y="1057739"/>
+            <a:ext cx="128016" cy="704088"/>
+          </a:xfrm>
+          <a:prstGeom prst="rect">
+            <a:avLst/>
+          </a:prstGeom>
+          <a:solidFill>
+            <a:schemeClr val="accent2"/>
+          </a:solidFill>
+          <a:ln>
+            <a:noFill/>
+          </a:ln>
+        </p:spPr>
+        <p:style>
+          <a:lnRef idx="2">
+            <a:schemeClr val="accent1">
+              <a:shade val="50000"/>
+            </a:schemeClr>
+          </a:lnRef>
+          <a:fillRef idx="1">
+            <a:schemeClr val="accent1"/>
+          </a:fillRef>
+          <a:effectRef idx="0">
+            <a:schemeClr val="accent1"/>
+          </a:effectRef>
+          <a:fontRef idx="minor">
+            <a:schemeClr val="lt1"/>
+          </a:fontRef>
+        </p:style>
+        <p:txBody>
+          <a:bodyPr rtlCol="0" anchor="ctr"/>
+          <a:lstStyle/>
+          <a:p>
+            <a:pPr algn="ctr"/>
+            <a:endParaRPr lang="en-US" dirty="0">
+              <a:solidFill>
+                <a:prstClr val="white"/>
+              </a:solidFill>
+              <a:latin typeface="Calibri" panose="020F0502020204030204"/>
+            </a:endParaRPr>
+          </a:p>
+        </p:txBody>
+      </p:sp>
+      <p:sp>
+        <p:nvSpPr>
+          <p:cNvPr id="20" name="Rectangle 19">
+            <a:extLst>
+              <a:ext uri="{FF2B5EF4-FFF2-40B4-BE49-F238E27FC236}">
+                <a16:creationId xmlns:a16="http://schemas.microsoft.com/office/drawing/2014/main" id="{0570A85B-3810-4F95-97B0-CBF4CCDB381C}"/>
+              </a:ext>
+              <a:ext uri="{C183D7F6-B498-43B3-948B-1728B52AA6E4}">
+                <adec:decorative xmlns:adec="http://schemas.microsoft.com/office/drawing/2017/decorative" val="1"/>
+              </a:ext>
+            </a:extLst>
+          </p:cNvPr>
+          <p:cNvSpPr>
+            <a:spLocks noGrp="1" noRot="1" noChangeAspect="1" noMove="1" noResize="1" noEditPoints="1" noAdjustHandles="1" noChangeArrowheads="1" noChangeShapeType="1" noTextEdit="1"/>
+          </p:cNvSpPr>
+          <p:nvPr>
+            <p:extLst>
+              <p:ext uri="{386F3935-93C4-4BCD-93E2-E3B085C9AB24}">
+                <p16:designElem xmlns:p16="http://schemas.microsoft.com/office/powerpoint/2015/main" val="1"/>
+              </p:ext>
+            </p:extLst>
+          </p:nvPr>
+        </p:nvSpPr>
+        <p:spPr>
+          <a:xfrm rot="5400000">
+            <a:off x="4243541" y="1400638"/>
+            <a:ext cx="1463040" cy="18288"/>
+          </a:xfrm>
+          <a:prstGeom prst="rect">
+            <a:avLst/>
+          </a:prstGeom>
+          <a:solidFill>
+            <a:srgbClr val="D5D5D5"/>
+          </a:solidFill>
+          <a:ln w="3175">
+            <a:noFill/>
+          </a:ln>
+          <a:effectLst/>
+        </p:spPr>
+        <p:style>
+          <a:lnRef idx="2">
+            <a:schemeClr val="accent1">
+              <a:shade val="50000"/>
+            </a:schemeClr>
+          </a:lnRef>
+          <a:fillRef idx="1">
+            <a:schemeClr val="accent1"/>
+          </a:fillRef>
+          <a:effectRef idx="0">
+            <a:schemeClr val="accent1"/>
+          </a:effectRef>
+          <a:fontRef idx="minor">
+            <a:schemeClr val="lt1"/>
+          </a:fontRef>
+        </p:style>
+        <p:txBody>
+          <a:bodyPr rtlCol="0" anchor="ctr"/>
+          <a:lstStyle/>
+          <a:p>
+            <a:pPr algn="ctr"/>
+            <a:endParaRPr lang="en-US">
+              <a:solidFill>
+                <a:prstClr val="white"/>
+              </a:solidFill>
+              <a:latin typeface="Calibri" panose="020F0502020204030204"/>
+            </a:endParaRPr>
+          </a:p>
+        </p:txBody>
+      </p:sp>
+      <p:sp>
+        <p:nvSpPr>
+          <p:cNvPr id="11" name="Retângulo 10">
+            <a:extLst>
+              <a:ext uri="{FF2B5EF4-FFF2-40B4-BE49-F238E27FC236}">
+                <a16:creationId xmlns:a16="http://schemas.microsoft.com/office/drawing/2014/main" id="{6C1A37FD-7E25-AAA5-9274-F4EF256C1672}"/>
+              </a:ext>
+            </a:extLst>
+          </p:cNvPr>
+          <p:cNvSpPr/>
+          <p:nvPr/>
+        </p:nvSpPr>
+        <p:spPr>
+          <a:xfrm>
+            <a:off x="4761186" y="515007"/>
+            <a:ext cx="588580" cy="1723696"/>
+          </a:xfrm>
+          <a:prstGeom prst="rect">
+            <a:avLst/>
+          </a:prstGeom>
+          <a:solidFill>
+            <a:schemeClr val="bg1"/>
+          </a:solidFill>
+          <a:ln>
+            <a:noFill/>
+          </a:ln>
+        </p:spPr>
+        <p:style>
+          <a:lnRef idx="2">
+            <a:schemeClr val="accent1">
+              <a:shade val="50000"/>
+            </a:schemeClr>
+          </a:lnRef>
+          <a:fillRef idx="1">
+            <a:schemeClr val="accent1"/>
+          </a:fillRef>
+          <a:effectRef idx="0">
+            <a:schemeClr val="accent1"/>
+          </a:effectRef>
+          <a:fontRef idx="minor">
+            <a:schemeClr val="lt1"/>
+          </a:fontRef>
+        </p:style>
+        <p:txBody>
+          <a:bodyPr rtlCol="0" anchor="ctr"/>
+          <a:lstStyle/>
+          <a:p>
+            <a:pPr algn="ctr"/>
+            <a:endParaRPr lang="pt-BR"/>
+          </a:p>
+        </p:txBody>
+      </p:sp>
+      <p:sp>
+        <p:nvSpPr>
+          <p:cNvPr id="3" name="Espaço Reservado para Conteúdo 2">
+            <a:extLst>
+              <a:ext uri="{FF2B5EF4-FFF2-40B4-BE49-F238E27FC236}">
+                <a16:creationId xmlns:a16="http://schemas.microsoft.com/office/drawing/2014/main" id="{78B60E7A-E086-09C5-4F5E-0BE03A55E3B6}"/>
+              </a:ext>
+            </a:extLst>
+          </p:cNvPr>
+          <p:cNvSpPr>
+            <a:spLocks noGrp="1"/>
+          </p:cNvSpPr>
+          <p:nvPr>
+            <p:ph idx="1"/>
+          </p:nvPr>
+        </p:nvSpPr>
+        <p:spPr>
+          <a:xfrm>
+            <a:off x="1460064" y="678262"/>
+            <a:ext cx="4123825" cy="1645920"/>
+          </a:xfrm>
+        </p:spPr>
+        <p:txBody>
+          <a:bodyPr anchor="ctr">
+            <a:normAutofit/>
+          </a:bodyPr>
+          <a:lstStyle/>
+          <a:p>
+            <a:pPr marL="0" indent="0">
+              <a:buNone/>
+            </a:pPr>
+            <a:r>
+              <a:rPr lang="pt-BR" sz="3000" b="1" i="1" dirty="0">
+                <a:latin typeface="+mj-lt"/>
+              </a:rPr>
+              <a:t>Fluxograma de problemas</a:t>
+            </a:r>
+          </a:p>
+        </p:txBody>
+      </p:sp>
+      <p:sp>
+        <p:nvSpPr>
+          <p:cNvPr id="10" name="Retângulo 9">
+            <a:extLst>
+              <a:ext uri="{FF2B5EF4-FFF2-40B4-BE49-F238E27FC236}">
+                <a16:creationId xmlns:a16="http://schemas.microsoft.com/office/drawing/2014/main" id="{7B7D4108-71C9-ED8A-8DC4-5AB4F9C2E216}"/>
+              </a:ext>
+            </a:extLst>
+          </p:cNvPr>
+          <p:cNvSpPr/>
+          <p:nvPr/>
+        </p:nvSpPr>
+        <p:spPr>
+          <a:xfrm>
+            <a:off x="490408" y="1057739"/>
+            <a:ext cx="128016" cy="704088"/>
+          </a:xfrm>
+          <a:prstGeom prst="rect">
+            <a:avLst/>
+          </a:prstGeom>
+          <a:solidFill>
+            <a:srgbClr val="FFC000"/>
+          </a:solidFill>
+          <a:ln>
+            <a:solidFill>
+              <a:srgbClr val="FFC000"/>
+            </a:solidFill>
+          </a:ln>
+        </p:spPr>
+        <p:style>
+          <a:lnRef idx="2">
+            <a:schemeClr val="accent1">
+              <a:shade val="50000"/>
+            </a:schemeClr>
+          </a:lnRef>
+          <a:fillRef idx="1">
+            <a:schemeClr val="accent1"/>
+          </a:fillRef>
+          <a:effectRef idx="0">
+            <a:schemeClr val="accent1"/>
+          </a:effectRef>
+          <a:fontRef idx="minor">
+            <a:schemeClr val="lt1"/>
+          </a:fontRef>
+        </p:style>
+        <p:txBody>
+          <a:bodyPr rtlCol="0" anchor="ctr"/>
+          <a:lstStyle/>
+          <a:p>
+            <a:pPr algn="ctr"/>
+            <a:endParaRPr lang="pt-BR"/>
+          </a:p>
+        </p:txBody>
+      </p:sp>
+      <p:cxnSp>
+        <p:nvCxnSpPr>
+          <p:cNvPr id="13" name="Conector reto 12">
+            <a:extLst>
+              <a:ext uri="{FF2B5EF4-FFF2-40B4-BE49-F238E27FC236}">
+                <a16:creationId xmlns:a16="http://schemas.microsoft.com/office/drawing/2014/main" id="{AF063251-1342-B564-2269-2A7CFE815174}"/>
+              </a:ext>
+            </a:extLst>
+          </p:cNvPr>
+          <p:cNvCxnSpPr/>
+          <p:nvPr/>
+        </p:nvCxnSpPr>
+        <p:spPr>
+          <a:xfrm>
+            <a:off x="6138138" y="870861"/>
+            <a:ext cx="0" cy="1181657"/>
+          </a:xfrm>
+          <a:prstGeom prst="line">
+            <a:avLst/>
+          </a:prstGeom>
+          <a:ln w="12700">
+            <a:solidFill>
+              <a:srgbClr val="FFC000"/>
+            </a:solidFill>
+          </a:ln>
+        </p:spPr>
+        <p:style>
+          <a:lnRef idx="1">
+            <a:schemeClr val="accent1"/>
+          </a:lnRef>
+          <a:fillRef idx="0">
+            <a:schemeClr val="accent1"/>
+          </a:fillRef>
+          <a:effectRef idx="0">
+            <a:schemeClr val="accent1"/>
+          </a:effectRef>
+          <a:fontRef idx="minor">
+            <a:schemeClr val="tx1"/>
+          </a:fontRef>
+        </p:style>
+      </p:cxnSp>
+      <p:sp>
+        <p:nvSpPr>
+          <p:cNvPr id="7" name="Título 1">
+            <a:extLst>
+              <a:ext uri="{FF2B5EF4-FFF2-40B4-BE49-F238E27FC236}">
+                <a16:creationId xmlns:a16="http://schemas.microsoft.com/office/drawing/2014/main" id="{90012830-BDEF-E3E7-56D1-092BFB9D3A04}"/>
+              </a:ext>
+            </a:extLst>
+          </p:cNvPr>
+          <p:cNvSpPr txBox="1">
+            <a:spLocks/>
+          </p:cNvSpPr>
+          <p:nvPr/>
+        </p:nvSpPr>
+        <p:spPr>
+          <a:xfrm>
+            <a:off x="9790659" y="1184146"/>
+            <a:ext cx="1014189" cy="634152"/>
+          </a:xfrm>
+          <a:prstGeom prst="rect">
+            <a:avLst/>
+          </a:prstGeom>
+        </p:spPr>
+        <p:txBody>
+          <a:bodyPr vert="horz" lIns="91440" tIns="45720" rIns="91440" bIns="45720" rtlCol="0" anchor="ctr">
+            <a:normAutofit fontScale="82500" lnSpcReduction="10000"/>
+          </a:bodyPr>
+          <a:lstStyle>
+            <a:lvl1pPr algn="l" defTabSz="914400" rtl="0" eaLnBrk="1" latinLnBrk="0" hangingPunct="1">
+              <a:lnSpc>
+                <a:spcPct val="90000"/>
+              </a:lnSpc>
+              <a:spcBef>
+                <a:spcPct val="0"/>
+              </a:spcBef>
+              <a:buNone/>
+              <a:defRPr sz="4400" kern="1200">
+                <a:solidFill>
+                  <a:schemeClr val="tx1"/>
+                </a:solidFill>
+                <a:latin typeface="+mj-lt"/>
+                <a:ea typeface="+mj-ea"/>
+                <a:cs typeface="+mj-cs"/>
+              </a:defRPr>
+            </a:lvl1pPr>
+          </a:lstStyle>
+          <a:p>
+            <a:r>
+              <a:rPr lang="pt-BR" sz="3100" i="1" dirty="0"/>
+              <a:t>Raia 4</a:t>
+            </a:r>
+            <a:endParaRPr lang="pt-BR" sz="2800" dirty="0"/>
+          </a:p>
+        </p:txBody>
+      </p:sp>
+      <p:cxnSp>
+        <p:nvCxnSpPr>
+          <p:cNvPr id="8" name="Conector reto 7">
+            <a:extLst>
+              <a:ext uri="{FF2B5EF4-FFF2-40B4-BE49-F238E27FC236}">
+                <a16:creationId xmlns:a16="http://schemas.microsoft.com/office/drawing/2014/main" id="{3F9F69C9-2EF7-A431-4F3C-2FFFD395052B}"/>
+              </a:ext>
+            </a:extLst>
+          </p:cNvPr>
+          <p:cNvCxnSpPr/>
+          <p:nvPr/>
+        </p:nvCxnSpPr>
+        <p:spPr>
+          <a:xfrm>
+            <a:off x="9027518" y="830698"/>
+            <a:ext cx="0" cy="1181657"/>
+          </a:xfrm>
+          <a:prstGeom prst="line">
+            <a:avLst/>
+          </a:prstGeom>
+          <a:ln w="12700">
+            <a:solidFill>
+              <a:srgbClr val="FFC000"/>
+            </a:solidFill>
+          </a:ln>
+        </p:spPr>
+        <p:style>
+          <a:lnRef idx="1">
+            <a:schemeClr val="accent1"/>
+          </a:lnRef>
+          <a:fillRef idx="0">
+            <a:schemeClr val="accent1"/>
+          </a:fillRef>
+          <a:effectRef idx="0">
+            <a:schemeClr val="accent1"/>
+          </a:effectRef>
+          <a:fontRef idx="minor">
+            <a:schemeClr val="tx1"/>
+          </a:fontRef>
+        </p:style>
+      </p:cxnSp>
+      <p:pic>
+        <p:nvPicPr>
+          <p:cNvPr id="5" name="Imagem 4">
+            <a:extLst>
+              <a:ext uri="{FF2B5EF4-FFF2-40B4-BE49-F238E27FC236}">
+                <a16:creationId xmlns:a16="http://schemas.microsoft.com/office/drawing/2014/main" id="{D4066BC7-52E6-2859-1427-56B4D6D8AA34}"/>
+              </a:ext>
+            </a:extLst>
+          </p:cNvPr>
+          <p:cNvPicPr>
+            <a:picLocks noChangeAspect="1"/>
+          </p:cNvPicPr>
+          <p:nvPr/>
+        </p:nvPicPr>
+        <p:blipFill rotWithShape="1">
+          <a:blip r:embed="rId2">
+            <a:extLst>
+              <a:ext uri="{28A0092B-C50C-407E-A947-70E740481C1C}">
+                <a14:useLocalDpi xmlns:a14="http://schemas.microsoft.com/office/drawing/2010/main" val="0"/>
+              </a:ext>
+            </a:extLst>
+          </a:blip>
+          <a:srcRect t="1780" b="9422"/>
+          <a:stretch/>
+        </p:blipFill>
+        <p:spPr>
+          <a:xfrm>
+            <a:off x="219420" y="2558254"/>
+            <a:ext cx="11621127" cy="4141126"/>
+          </a:xfrm>
+          <a:prstGeom prst="rect">
+            <a:avLst/>
+          </a:prstGeom>
+        </p:spPr>
+      </p:pic>
+    </p:spTree>
+    <p:extLst>
+      <p:ext uri="{BB962C8B-B14F-4D97-AF65-F5344CB8AC3E}">
+        <p14:creationId xmlns:p14="http://schemas.microsoft.com/office/powerpoint/2010/main" val="135636078"/>
       </p:ext>
     </p:extLst>
   </p:cSld>
@@ -7561,8 +8653,8 @@
         </p:nvSpPr>
         <p:spPr>
           <a:xfrm>
-            <a:off x="620111" y="2375338"/>
-            <a:ext cx="11571890" cy="1313793"/>
+            <a:off x="531845" y="2375338"/>
+            <a:ext cx="11660156" cy="1313793"/>
           </a:xfrm>
           <a:prstGeom prst="rect">
             <a:avLst/>
@@ -7599,41 +8691,6 @@
           </a:p>
         </p:txBody>
       </p:sp>
-      <p:pic>
-        <p:nvPicPr>
-          <p:cNvPr id="5" name="Espaço Reservado para Conteúdo 4" descr="Diagrama, Esquemático&#10;&#10;Descrição gerada automaticamente">
-            <a:extLst>
-              <a:ext uri="{FF2B5EF4-FFF2-40B4-BE49-F238E27FC236}">
-                <a16:creationId xmlns:a16="http://schemas.microsoft.com/office/drawing/2014/main" id="{A716295B-8B9E-C19F-F2E6-853461BD0DEF}"/>
-              </a:ext>
-            </a:extLst>
-          </p:cNvPr>
-          <p:cNvPicPr>
-            <a:picLocks noGrp="1" noChangeAspect="1"/>
-          </p:cNvPicPr>
-          <p:nvPr>
-            <p:ph idx="1"/>
-          </p:nvPr>
-        </p:nvPicPr>
-        <p:blipFill>
-          <a:blip r:embed="rId2">
-            <a:extLst>
-              <a:ext uri="{28A0092B-C50C-407E-A947-70E740481C1C}">
-                <a14:useLocalDpi xmlns:a14="http://schemas.microsoft.com/office/drawing/2010/main" val="0"/>
-              </a:ext>
-            </a:extLst>
-          </a:blip>
-          <a:stretch>
-            <a:fillRect/>
-          </a:stretch>
-        </p:blipFill>
-        <p:spPr>
-          <a:xfrm>
-            <a:off x="3688495" y="1"/>
-            <a:ext cx="8319302" cy="6858000"/>
-          </a:xfrm>
-        </p:spPr>
-      </p:pic>
       <p:sp>
         <p:nvSpPr>
           <p:cNvPr id="6" name="Subtítulo 2">
@@ -7650,8 +8707,8 @@
         </p:nvSpPr>
         <p:spPr>
           <a:xfrm>
-            <a:off x="152673" y="1061368"/>
-            <a:ext cx="3454924" cy="729526"/>
+            <a:off x="531845" y="647088"/>
+            <a:ext cx="2226632" cy="729526"/>
           </a:xfrm>
           <a:prstGeom prst="rect">
             <a:avLst/>
@@ -7826,8 +8883,9 @@
             </a:lvl9pPr>
           </a:lstStyle>
           <a:p>
+            <a:pPr algn="l"/>
             <a:r>
-              <a:rPr lang="pt-BR" sz="2800" dirty="0"/>
+              <a:rPr lang="pt-BR" sz="2900" dirty="0"/>
               <a:t>Fluxograma de requisição e incidente</a:t>
             </a:r>
           </a:p>
@@ -7885,6 +8943,42 @@
           </a:p>
         </p:txBody>
       </p:sp>
+      <p:pic>
+        <p:nvPicPr>
+          <p:cNvPr id="8" name="Imagem 7">
+            <a:extLst>
+              <a:ext uri="{FF2B5EF4-FFF2-40B4-BE49-F238E27FC236}">
+                <a16:creationId xmlns:a16="http://schemas.microsoft.com/office/drawing/2014/main" id="{9870C1AC-8A4C-7EEA-A220-8CB8D0FBA623}"/>
+              </a:ext>
+            </a:extLst>
+          </p:cNvPr>
+          <p:cNvPicPr>
+            <a:picLocks noChangeAspect="1"/>
+          </p:cNvPicPr>
+          <p:nvPr/>
+        </p:nvPicPr>
+        <p:blipFill>
+          <a:blip r:embed="rId2">
+            <a:extLst>
+              <a:ext uri="{28A0092B-C50C-407E-A947-70E740481C1C}">
+                <a14:useLocalDpi xmlns:a14="http://schemas.microsoft.com/office/drawing/2010/main" val="0"/>
+              </a:ext>
+            </a:extLst>
+          </a:blip>
+          <a:stretch>
+            <a:fillRect/>
+          </a:stretch>
+        </p:blipFill>
+        <p:spPr>
+          <a:xfrm>
+            <a:off x="3132493" y="153955"/>
+            <a:ext cx="8906834" cy="6550090"/>
+          </a:xfrm>
+          <a:prstGeom prst="rect">
+            <a:avLst/>
+          </a:prstGeom>
+        </p:spPr>
+      </p:pic>
     </p:spTree>
     <p:extLst>
       <p:ext uri="{BB962C8B-B14F-4D97-AF65-F5344CB8AC3E}">
@@ -8100,7 +9194,7 @@
         </p:nvSpPr>
         <p:spPr>
           <a:xfrm>
-            <a:off x="8340738" y="1334765"/>
+            <a:off x="6938698" y="1326721"/>
             <a:ext cx="2718690" cy="634152"/>
           </a:xfrm>
         </p:spPr>
@@ -8342,53 +9436,14 @@
               <a:buNone/>
             </a:pPr>
             <a:r>
-              <a:rPr lang="pt-BR" sz="3200" b="1" i="1" dirty="0">
+              <a:rPr lang="pt-BR" sz="3000" b="1" i="1" dirty="0">
                 <a:latin typeface="+mj-lt"/>
               </a:rPr>
               <a:t>Fluxograma de requisição e incidente</a:t>
             </a:r>
-            <a:endParaRPr lang="pt-BR" sz="1800" b="1" i="1" dirty="0">
-              <a:latin typeface="+mj-lt"/>
-            </a:endParaRPr>
-          </a:p>
-        </p:txBody>
-      </p:sp>
-      <p:pic>
-        <p:nvPicPr>
-          <p:cNvPr id="9" name="Espaço Reservado para Conteúdo 6" descr="Forma, Retângulo&#10;&#10;Descrição gerada automaticamente">
-            <a:extLst>
-              <a:ext uri="{FF2B5EF4-FFF2-40B4-BE49-F238E27FC236}">
-                <a16:creationId xmlns:a16="http://schemas.microsoft.com/office/drawing/2014/main" id="{8530041F-0467-41E1-F7B7-BF72DD215E1C}"/>
-              </a:ext>
-            </a:extLst>
-          </p:cNvPr>
-          <p:cNvPicPr>
-            <a:picLocks noChangeAspect="1"/>
-          </p:cNvPicPr>
-          <p:nvPr/>
-        </p:nvPicPr>
-        <p:blipFill>
-          <a:blip r:embed="rId2">
-            <a:extLst>
-              <a:ext uri="{28A0092B-C50C-407E-A947-70E740481C1C}">
-                <a14:useLocalDpi xmlns:a14="http://schemas.microsoft.com/office/drawing/2010/main" val="0"/>
-              </a:ext>
-            </a:extLst>
-          </a:blip>
-          <a:stretch>
-            <a:fillRect/>
-          </a:stretch>
-        </p:blipFill>
-        <p:spPr>
-          <a:xfrm>
-            <a:off x="618424" y="4148262"/>
-            <a:ext cx="11164824" cy="2344613"/>
-          </a:xfrm>
-          <a:prstGeom prst="rect">
-            <a:avLst/>
-          </a:prstGeom>
-        </p:spPr>
-      </p:pic>
+          </a:p>
+        </p:txBody>
+      </p:sp>
       <p:sp>
         <p:nvSpPr>
           <p:cNvPr id="10" name="Retângulo 9">
@@ -8457,7 +9512,7 @@
         </p:nvCxnSpPr>
         <p:spPr>
           <a:xfrm>
-            <a:off x="7609490" y="819807"/>
+            <a:off x="6657768" y="870861"/>
             <a:ext cx="0" cy="1181657"/>
           </a:xfrm>
           <a:prstGeom prst="line">
@@ -8500,7 +9555,7 @@
         </p:nvSpPr>
         <p:spPr>
           <a:xfrm>
-            <a:off x="1338477" y="3311319"/>
+            <a:off x="618424" y="3094935"/>
             <a:ext cx="2632364" cy="523803"/>
           </a:xfrm>
           <a:prstGeom prst="rect">
@@ -8702,7 +9757,7 @@
         </p:nvSpPr>
         <p:spPr>
           <a:xfrm>
-            <a:off x="8887851" y="3311319"/>
+            <a:off x="6535565" y="3031920"/>
             <a:ext cx="2632364" cy="523803"/>
           </a:xfrm>
           <a:prstGeom prst="rect">
@@ -8888,6 +9943,239 @@
           </a:p>
         </p:txBody>
       </p:sp>
+      <p:pic>
+        <p:nvPicPr>
+          <p:cNvPr id="4" name="Imagem 3" descr="Diagrama&#10;&#10;Descrição gerada automaticamente">
+            <a:extLst>
+              <a:ext uri="{FF2B5EF4-FFF2-40B4-BE49-F238E27FC236}">
+                <a16:creationId xmlns:a16="http://schemas.microsoft.com/office/drawing/2014/main" id="{8778946B-B25A-CC37-5A32-48D2DCD81240}"/>
+              </a:ext>
+            </a:extLst>
+          </p:cNvPr>
+          <p:cNvPicPr>
+            <a:picLocks noChangeAspect="1"/>
+          </p:cNvPicPr>
+          <p:nvPr/>
+        </p:nvPicPr>
+        <p:blipFill>
+          <a:blip r:embed="rId2">
+            <a:extLst>
+              <a:ext uri="{28A0092B-C50C-407E-A947-70E740481C1C}">
+                <a14:useLocalDpi xmlns:a14="http://schemas.microsoft.com/office/drawing/2010/main" val="0"/>
+              </a:ext>
+            </a:extLst>
+          </a:blip>
+          <a:stretch>
+            <a:fillRect/>
+          </a:stretch>
+        </p:blipFill>
+        <p:spPr>
+          <a:xfrm>
+            <a:off x="154106" y="4090421"/>
+            <a:ext cx="11968065" cy="2089317"/>
+          </a:xfrm>
+          <a:prstGeom prst="rect">
+            <a:avLst/>
+          </a:prstGeom>
+        </p:spPr>
+      </p:pic>
+      <p:sp>
+        <p:nvSpPr>
+          <p:cNvPr id="5" name="Chave Direita 4">
+            <a:extLst>
+              <a:ext uri="{FF2B5EF4-FFF2-40B4-BE49-F238E27FC236}">
+                <a16:creationId xmlns:a16="http://schemas.microsoft.com/office/drawing/2014/main" id="{47B9CEBE-FC71-8F00-DBA5-46B215B7AF57}"/>
+              </a:ext>
+            </a:extLst>
+          </p:cNvPr>
+          <p:cNvSpPr/>
+          <p:nvPr/>
+        </p:nvSpPr>
+        <p:spPr>
+          <a:xfrm rot="16200000">
+            <a:off x="1660614" y="2568098"/>
+            <a:ext cx="398613" cy="2260322"/>
+          </a:xfrm>
+          <a:prstGeom prst="rightBrace">
+            <a:avLst/>
+          </a:prstGeom>
+          <a:ln>
+            <a:solidFill>
+              <a:schemeClr val="accent4"/>
+            </a:solidFill>
+          </a:ln>
+        </p:spPr>
+        <p:style>
+          <a:lnRef idx="1">
+            <a:schemeClr val="accent1"/>
+          </a:lnRef>
+          <a:fillRef idx="0">
+            <a:schemeClr val="accent1"/>
+          </a:fillRef>
+          <a:effectRef idx="0">
+            <a:schemeClr val="accent1"/>
+          </a:effectRef>
+          <a:fontRef idx="minor">
+            <a:schemeClr val="tx1"/>
+          </a:fontRef>
+        </p:style>
+        <p:txBody>
+          <a:bodyPr rtlCol="0" anchor="ctr"/>
+          <a:lstStyle/>
+          <a:p>
+            <a:pPr algn="ctr"/>
+            <a:endParaRPr lang="pt-BR"/>
+          </a:p>
+        </p:txBody>
+      </p:sp>
+      <p:sp>
+        <p:nvSpPr>
+          <p:cNvPr id="6" name="Chave Direita 5">
+            <a:extLst>
+              <a:ext uri="{FF2B5EF4-FFF2-40B4-BE49-F238E27FC236}">
+                <a16:creationId xmlns:a16="http://schemas.microsoft.com/office/drawing/2014/main" id="{DA023BCE-8C7F-28CB-AA56-B1DDB1FFD700}"/>
+              </a:ext>
+            </a:extLst>
+          </p:cNvPr>
+          <p:cNvSpPr/>
+          <p:nvPr/>
+        </p:nvSpPr>
+        <p:spPr>
+          <a:xfrm rot="16200000">
+            <a:off x="7522087" y="425301"/>
+            <a:ext cx="398613" cy="6459943"/>
+          </a:xfrm>
+          <a:prstGeom prst="rightBrace">
+            <a:avLst/>
+          </a:prstGeom>
+          <a:ln>
+            <a:solidFill>
+              <a:schemeClr val="accent4"/>
+            </a:solidFill>
+          </a:ln>
+        </p:spPr>
+        <p:style>
+          <a:lnRef idx="1">
+            <a:schemeClr val="accent1"/>
+          </a:lnRef>
+          <a:fillRef idx="0">
+            <a:schemeClr val="accent1"/>
+          </a:fillRef>
+          <a:effectRef idx="0">
+            <a:schemeClr val="accent1"/>
+          </a:effectRef>
+          <a:fontRef idx="minor">
+            <a:schemeClr val="tx1"/>
+          </a:fontRef>
+        </p:style>
+        <p:txBody>
+          <a:bodyPr rtlCol="0" anchor="ctr"/>
+          <a:lstStyle/>
+          <a:p>
+            <a:pPr algn="ctr"/>
+            <a:endParaRPr lang="pt-BR"/>
+          </a:p>
+        </p:txBody>
+      </p:sp>
+      <p:sp>
+        <p:nvSpPr>
+          <p:cNvPr id="7" name="Título 1">
+            <a:extLst>
+              <a:ext uri="{FF2B5EF4-FFF2-40B4-BE49-F238E27FC236}">
+                <a16:creationId xmlns:a16="http://schemas.microsoft.com/office/drawing/2014/main" id="{90012830-BDEF-E3E7-56D1-092BFB9D3A04}"/>
+              </a:ext>
+            </a:extLst>
+          </p:cNvPr>
+          <p:cNvSpPr txBox="1">
+            <a:spLocks/>
+          </p:cNvSpPr>
+          <p:nvPr/>
+        </p:nvSpPr>
+        <p:spPr>
+          <a:xfrm>
+            <a:off x="10315712" y="1326721"/>
+            <a:ext cx="1036526" cy="634152"/>
+          </a:xfrm>
+          <a:prstGeom prst="rect">
+            <a:avLst/>
+          </a:prstGeom>
+        </p:spPr>
+        <p:txBody>
+          <a:bodyPr vert="horz" lIns="91440" tIns="45720" rIns="91440" bIns="45720" rtlCol="0" anchor="ctr">
+            <a:normAutofit fontScale="82500" lnSpcReduction="20000"/>
+          </a:bodyPr>
+          <a:lstStyle>
+            <a:lvl1pPr algn="l" defTabSz="914400" rtl="0" eaLnBrk="1" latinLnBrk="0" hangingPunct="1">
+              <a:lnSpc>
+                <a:spcPct val="90000"/>
+              </a:lnSpc>
+              <a:spcBef>
+                <a:spcPct val="0"/>
+              </a:spcBef>
+              <a:buNone/>
+              <a:defRPr sz="4400" kern="1200">
+                <a:solidFill>
+                  <a:schemeClr val="tx1"/>
+                </a:solidFill>
+                <a:latin typeface="+mj-lt"/>
+                <a:ea typeface="+mj-ea"/>
+                <a:cs typeface="+mj-cs"/>
+              </a:defRPr>
+            </a:lvl1pPr>
+          </a:lstStyle>
+          <a:p>
+            <a:r>
+              <a:rPr lang="pt-BR" sz="3100" i="1" dirty="0"/>
+              <a:t>Raia 1</a:t>
+            </a:r>
+            <a:br>
+              <a:rPr lang="pt-BR" sz="2800" dirty="0"/>
+            </a:br>
+            <a:endParaRPr lang="pt-BR" sz="2800" dirty="0"/>
+          </a:p>
+        </p:txBody>
+      </p:sp>
+      <p:cxnSp>
+        <p:nvCxnSpPr>
+          <p:cNvPr id="8" name="Conector reto 7">
+            <a:extLst>
+              <a:ext uri="{FF2B5EF4-FFF2-40B4-BE49-F238E27FC236}">
+                <a16:creationId xmlns:a16="http://schemas.microsoft.com/office/drawing/2014/main" id="{3F9F69C9-2EF7-A431-4F3C-2FFFD395052B}"/>
+              </a:ext>
+            </a:extLst>
+          </p:cNvPr>
+          <p:cNvCxnSpPr/>
+          <p:nvPr/>
+        </p:nvCxnSpPr>
+        <p:spPr>
+          <a:xfrm>
+            <a:off x="9876829" y="830698"/>
+            <a:ext cx="0" cy="1181657"/>
+          </a:xfrm>
+          <a:prstGeom prst="line">
+            <a:avLst/>
+          </a:prstGeom>
+          <a:ln w="12700">
+            <a:solidFill>
+              <a:srgbClr val="FFC000"/>
+            </a:solidFill>
+          </a:ln>
+        </p:spPr>
+        <p:style>
+          <a:lnRef idx="1">
+            <a:schemeClr val="accent1"/>
+          </a:lnRef>
+          <a:fillRef idx="0">
+            <a:schemeClr val="accent1"/>
+          </a:fillRef>
+          <a:effectRef idx="0">
+            <a:schemeClr val="accent1"/>
+          </a:effectRef>
+          <a:fontRef idx="minor">
+            <a:schemeClr val="tx1"/>
+          </a:fontRef>
+        </p:style>
+      </p:cxnSp>
     </p:spTree>
     <p:extLst>
       <p:ext uri="{BB962C8B-B14F-4D97-AF65-F5344CB8AC3E}">
@@ -9103,8 +10391,8 @@
         </p:nvSpPr>
         <p:spPr>
           <a:xfrm>
-            <a:off x="9017053" y="1409782"/>
-            <a:ext cx="1297248" cy="634152"/>
+            <a:off x="7509265" y="1326721"/>
+            <a:ext cx="1206925" cy="634152"/>
           </a:xfrm>
         </p:spPr>
         <p:txBody>
@@ -9114,7 +10402,7 @@
           <a:lstStyle/>
           <a:p>
             <a:r>
-              <a:rPr lang="pt-BR" sz="3300" i="1" dirty="0"/>
+              <a:rPr lang="pt-BR" sz="3200" i="1" dirty="0"/>
               <a:t>Nível 1</a:t>
             </a:r>
             <a:br>
@@ -9345,14 +10633,11 @@
               <a:buNone/>
             </a:pPr>
             <a:r>
-              <a:rPr lang="pt-BR" sz="3200" b="1" i="1" dirty="0">
+              <a:rPr lang="pt-BR" sz="3000" b="1" i="1" dirty="0">
                 <a:latin typeface="+mj-lt"/>
               </a:rPr>
               <a:t>Fluxograma de requisição e incidente</a:t>
             </a:r>
-            <a:endParaRPr lang="pt-BR" sz="1800" b="1" i="1" dirty="0">
-              <a:latin typeface="+mj-lt"/>
-            </a:endParaRPr>
           </a:p>
         </p:txBody>
       </p:sp>
@@ -9424,7 +10709,7 @@
         </p:nvCxnSpPr>
         <p:spPr>
           <a:xfrm>
-            <a:off x="7609490" y="819807"/>
+            <a:off x="6863042" y="870861"/>
             <a:ext cx="0" cy="1181657"/>
           </a:xfrm>
           <a:prstGeom prst="line">
@@ -9451,12 +10736,111 @@
           </a:fontRef>
         </p:style>
       </p:cxnSp>
+      <p:sp>
+        <p:nvSpPr>
+          <p:cNvPr id="7" name="Título 1">
+            <a:extLst>
+              <a:ext uri="{FF2B5EF4-FFF2-40B4-BE49-F238E27FC236}">
+                <a16:creationId xmlns:a16="http://schemas.microsoft.com/office/drawing/2014/main" id="{90012830-BDEF-E3E7-56D1-092BFB9D3A04}"/>
+              </a:ext>
+            </a:extLst>
+          </p:cNvPr>
+          <p:cNvSpPr txBox="1">
+            <a:spLocks/>
+          </p:cNvSpPr>
+          <p:nvPr/>
+        </p:nvSpPr>
+        <p:spPr>
+          <a:xfrm>
+            <a:off x="9994244" y="1326721"/>
+            <a:ext cx="1036526" cy="634152"/>
+          </a:xfrm>
+          <a:prstGeom prst="rect">
+            <a:avLst/>
+          </a:prstGeom>
+        </p:spPr>
+        <p:txBody>
+          <a:bodyPr vert="horz" lIns="91440" tIns="45720" rIns="91440" bIns="45720" rtlCol="0" anchor="ctr">
+            <a:normAutofit fontScale="82500" lnSpcReduction="20000"/>
+          </a:bodyPr>
+          <a:lstStyle>
+            <a:lvl1pPr algn="l" defTabSz="914400" rtl="0" eaLnBrk="1" latinLnBrk="0" hangingPunct="1">
+              <a:lnSpc>
+                <a:spcPct val="90000"/>
+              </a:lnSpc>
+              <a:spcBef>
+                <a:spcPct val="0"/>
+              </a:spcBef>
+              <a:buNone/>
+              <a:defRPr sz="4400" kern="1200">
+                <a:solidFill>
+                  <a:schemeClr val="tx1"/>
+                </a:solidFill>
+                <a:latin typeface="+mj-lt"/>
+                <a:ea typeface="+mj-ea"/>
+                <a:cs typeface="+mj-cs"/>
+              </a:defRPr>
+            </a:lvl1pPr>
+          </a:lstStyle>
+          <a:p>
+            <a:r>
+              <a:rPr lang="pt-BR" sz="3100" i="1" dirty="0"/>
+              <a:t>Raia 2</a:t>
+            </a:r>
+            <a:br>
+              <a:rPr lang="pt-BR" sz="2800" dirty="0"/>
+            </a:br>
+            <a:endParaRPr lang="pt-BR" sz="2800" dirty="0"/>
+          </a:p>
+        </p:txBody>
+      </p:sp>
+      <p:cxnSp>
+        <p:nvCxnSpPr>
+          <p:cNvPr id="8" name="Conector reto 7">
+            <a:extLst>
+              <a:ext uri="{FF2B5EF4-FFF2-40B4-BE49-F238E27FC236}">
+                <a16:creationId xmlns:a16="http://schemas.microsoft.com/office/drawing/2014/main" id="{3F9F69C9-2EF7-A431-4F3C-2FFFD395052B}"/>
+              </a:ext>
+            </a:extLst>
+          </p:cNvPr>
+          <p:cNvCxnSpPr/>
+          <p:nvPr/>
+        </p:nvCxnSpPr>
+        <p:spPr>
+          <a:xfrm>
+            <a:off x="9344984" y="830698"/>
+            <a:ext cx="0" cy="1181657"/>
+          </a:xfrm>
+          <a:prstGeom prst="line">
+            <a:avLst/>
+          </a:prstGeom>
+          <a:ln w="12700">
+            <a:solidFill>
+              <a:srgbClr val="FFC000"/>
+            </a:solidFill>
+          </a:ln>
+        </p:spPr>
+        <p:style>
+          <a:lnRef idx="1">
+            <a:schemeClr val="accent1"/>
+          </a:lnRef>
+          <a:fillRef idx="0">
+            <a:schemeClr val="accent1"/>
+          </a:fillRef>
+          <a:effectRef idx="0">
+            <a:schemeClr val="accent1"/>
+          </a:effectRef>
+          <a:fontRef idx="minor">
+            <a:schemeClr val="tx1"/>
+          </a:fontRef>
+        </p:style>
+      </p:cxnSp>
       <p:pic>
         <p:nvPicPr>
-          <p:cNvPr id="4" name="Espaço Reservado para Conteúdo 4" descr="Diagrama&#10;&#10;Descrição gerada automaticamente">
-            <a:extLst>
-              <a:ext uri="{FF2B5EF4-FFF2-40B4-BE49-F238E27FC236}">
-                <a16:creationId xmlns:a16="http://schemas.microsoft.com/office/drawing/2014/main" id="{17C1C829-E3D3-F2FD-7688-854EEAF3F4FD}"/>
+          <p:cNvPr id="9" name="Imagem 8" descr="Diagrama&#10;&#10;Descrição gerada automaticamente">
+            <a:extLst>
+              <a:ext uri="{FF2B5EF4-FFF2-40B4-BE49-F238E27FC236}">
+                <a16:creationId xmlns:a16="http://schemas.microsoft.com/office/drawing/2014/main" id="{B12D25C4-5699-66C3-BB4B-EA7D24DB163A}"/>
               </a:ext>
             </a:extLst>
           </p:cNvPr>
@@ -9479,8 +10863,8 @@
         </p:blipFill>
         <p:spPr>
           <a:xfrm>
-            <a:off x="298119" y="2617697"/>
-            <a:ext cx="11595761" cy="3858773"/>
+            <a:off x="70833" y="3083295"/>
+            <a:ext cx="12050334" cy="3519489"/>
           </a:xfrm>
           <a:prstGeom prst="rect">
             <a:avLst/>
@@ -9490,7 +10874,7 @@
     </p:spTree>
     <p:extLst>
       <p:ext uri="{BB962C8B-B14F-4D97-AF65-F5344CB8AC3E}">
-        <p14:creationId xmlns:p14="http://schemas.microsoft.com/office/powerpoint/2010/main" val="2823702828"/>
+        <p14:creationId xmlns:p14="http://schemas.microsoft.com/office/powerpoint/2010/main" val="590237984"/>
       </p:ext>
     </p:extLst>
   </p:cSld>
@@ -9954,10 +11338,10 @@
       </p:sp>
       <p:pic>
         <p:nvPicPr>
-          <p:cNvPr id="4" name="Espaço Reservado para Conteúdo 4" descr="Diagrama&#10;&#10;Descrição gerada automaticamente">
-            <a:extLst>
-              <a:ext uri="{FF2B5EF4-FFF2-40B4-BE49-F238E27FC236}">
-                <a16:creationId xmlns:a16="http://schemas.microsoft.com/office/drawing/2014/main" id="{D4C1812E-8A4F-BE61-368F-28FC0AA968B8}"/>
+          <p:cNvPr id="3" name="Imagem 2" descr="Diagrama&#10;&#10;Descrição gerada automaticamente">
+            <a:extLst>
+              <a:ext uri="{FF2B5EF4-FFF2-40B4-BE49-F238E27FC236}">
+                <a16:creationId xmlns:a16="http://schemas.microsoft.com/office/drawing/2014/main" id="{7674916C-CF9C-8DAB-432B-53A0E03FCB0B}"/>
               </a:ext>
             </a:extLst>
           </p:cNvPr>
@@ -9980,8 +11364,8 @@
         </p:blipFill>
         <p:spPr>
           <a:xfrm>
-            <a:off x="5670030" y="906988"/>
-            <a:ext cx="3984399" cy="5208364"/>
+            <a:off x="5598932" y="794505"/>
+            <a:ext cx="4126596" cy="5400237"/>
           </a:xfrm>
           <a:prstGeom prst="rect">
             <a:avLst/>
@@ -10203,8 +11587,8 @@
         </p:nvSpPr>
         <p:spPr>
           <a:xfrm>
-            <a:off x="9017053" y="1409782"/>
-            <a:ext cx="1297248" cy="634152"/>
+            <a:off x="7509265" y="1326721"/>
+            <a:ext cx="1206925" cy="634152"/>
           </a:xfrm>
         </p:spPr>
         <p:txBody>
@@ -10214,7 +11598,7 @@
           <a:lstStyle/>
           <a:p>
             <a:r>
-              <a:rPr lang="pt-BR" sz="3300" i="1" dirty="0"/>
+              <a:rPr lang="pt-BR" sz="3200" i="1" dirty="0"/>
               <a:t>Nível 2</a:t>
             </a:r>
             <a:br>
@@ -10445,14 +11829,11 @@
               <a:buNone/>
             </a:pPr>
             <a:r>
-              <a:rPr lang="pt-BR" sz="3200" b="1" i="1" dirty="0">
+              <a:rPr lang="pt-BR" sz="3000" b="1" i="1" dirty="0">
                 <a:latin typeface="+mj-lt"/>
               </a:rPr>
               <a:t>Fluxograma de requisição e incidente</a:t>
             </a:r>
-            <a:endParaRPr lang="pt-BR" sz="1800" b="1" i="1" dirty="0">
-              <a:latin typeface="+mj-lt"/>
-            </a:endParaRPr>
           </a:p>
         </p:txBody>
       </p:sp>
@@ -10524,7 +11905,7 @@
         </p:nvCxnSpPr>
         <p:spPr>
           <a:xfrm>
-            <a:off x="7609490" y="819807"/>
+            <a:off x="6863042" y="870861"/>
             <a:ext cx="0" cy="1181657"/>
           </a:xfrm>
           <a:prstGeom prst="line">
@@ -10551,12 +11932,111 @@
           </a:fontRef>
         </p:style>
       </p:cxnSp>
+      <p:sp>
+        <p:nvSpPr>
+          <p:cNvPr id="7" name="Título 1">
+            <a:extLst>
+              <a:ext uri="{FF2B5EF4-FFF2-40B4-BE49-F238E27FC236}">
+                <a16:creationId xmlns:a16="http://schemas.microsoft.com/office/drawing/2014/main" id="{90012830-BDEF-E3E7-56D1-092BFB9D3A04}"/>
+              </a:ext>
+            </a:extLst>
+          </p:cNvPr>
+          <p:cNvSpPr txBox="1">
+            <a:spLocks/>
+          </p:cNvSpPr>
+          <p:nvPr/>
+        </p:nvSpPr>
+        <p:spPr>
+          <a:xfrm>
+            <a:off x="9994244" y="1326721"/>
+            <a:ext cx="1036526" cy="634152"/>
+          </a:xfrm>
+          <a:prstGeom prst="rect">
+            <a:avLst/>
+          </a:prstGeom>
+        </p:spPr>
+        <p:txBody>
+          <a:bodyPr vert="horz" lIns="91440" tIns="45720" rIns="91440" bIns="45720" rtlCol="0" anchor="ctr">
+            <a:normAutofit fontScale="82500" lnSpcReduction="20000"/>
+          </a:bodyPr>
+          <a:lstStyle>
+            <a:lvl1pPr algn="l" defTabSz="914400" rtl="0" eaLnBrk="1" latinLnBrk="0" hangingPunct="1">
+              <a:lnSpc>
+                <a:spcPct val="90000"/>
+              </a:lnSpc>
+              <a:spcBef>
+                <a:spcPct val="0"/>
+              </a:spcBef>
+              <a:buNone/>
+              <a:defRPr sz="4400" kern="1200">
+                <a:solidFill>
+                  <a:schemeClr val="tx1"/>
+                </a:solidFill>
+                <a:latin typeface="+mj-lt"/>
+                <a:ea typeface="+mj-ea"/>
+                <a:cs typeface="+mj-cs"/>
+              </a:defRPr>
+            </a:lvl1pPr>
+          </a:lstStyle>
+          <a:p>
+            <a:r>
+              <a:rPr lang="pt-BR" sz="3100" i="1" dirty="0"/>
+              <a:t>Raia 3</a:t>
+            </a:r>
+            <a:br>
+              <a:rPr lang="pt-BR" sz="2800" dirty="0"/>
+            </a:br>
+            <a:endParaRPr lang="pt-BR" sz="2800" dirty="0"/>
+          </a:p>
+        </p:txBody>
+      </p:sp>
+      <p:cxnSp>
+        <p:nvCxnSpPr>
+          <p:cNvPr id="8" name="Conector reto 7">
+            <a:extLst>
+              <a:ext uri="{FF2B5EF4-FFF2-40B4-BE49-F238E27FC236}">
+                <a16:creationId xmlns:a16="http://schemas.microsoft.com/office/drawing/2014/main" id="{3F9F69C9-2EF7-A431-4F3C-2FFFD395052B}"/>
+              </a:ext>
+            </a:extLst>
+          </p:cNvPr>
+          <p:cNvCxnSpPr/>
+          <p:nvPr/>
+        </p:nvCxnSpPr>
+        <p:spPr>
+          <a:xfrm>
+            <a:off x="9344984" y="830698"/>
+            <a:ext cx="0" cy="1181657"/>
+          </a:xfrm>
+          <a:prstGeom prst="line">
+            <a:avLst/>
+          </a:prstGeom>
+          <a:ln w="12700">
+            <a:solidFill>
+              <a:srgbClr val="FFC000"/>
+            </a:solidFill>
+          </a:ln>
+        </p:spPr>
+        <p:style>
+          <a:lnRef idx="1">
+            <a:schemeClr val="accent1"/>
+          </a:lnRef>
+          <a:fillRef idx="0">
+            <a:schemeClr val="accent1"/>
+          </a:fillRef>
+          <a:effectRef idx="0">
+            <a:schemeClr val="accent1"/>
+          </a:effectRef>
+          <a:fontRef idx="minor">
+            <a:schemeClr val="tx1"/>
+          </a:fontRef>
+        </p:style>
+      </p:cxnSp>
       <p:pic>
         <p:nvPicPr>
-          <p:cNvPr id="5" name="Espaço Reservado para Conteúdo 4" descr="Diagrama&#10;&#10;Descrição gerada automaticamente">
-            <a:extLst>
-              <a:ext uri="{FF2B5EF4-FFF2-40B4-BE49-F238E27FC236}">
-                <a16:creationId xmlns:a16="http://schemas.microsoft.com/office/drawing/2014/main" id="{78F97990-E907-F9C3-A93B-CD2A6543F326}"/>
+          <p:cNvPr id="4" name="Espaço Reservado para Conteúdo 4" descr="Diagrama&#10;&#10;Descrição gerada automaticamente">
+            <a:extLst>
+              <a:ext uri="{FF2B5EF4-FFF2-40B4-BE49-F238E27FC236}">
+                <a16:creationId xmlns:a16="http://schemas.microsoft.com/office/drawing/2014/main" id="{B4E73C5F-807C-1E61-D8FA-E4B8C3B6A03F}"/>
               </a:ext>
             </a:extLst>
           </p:cNvPr>
@@ -10565,7 +12045,7 @@
           </p:cNvPicPr>
           <p:nvPr/>
         </p:nvPicPr>
-        <p:blipFill>
+        <p:blipFill rotWithShape="1">
           <a:blip r:embed="rId2">
             <a:extLst>
               <a:ext uri="{28A0092B-C50C-407E-A947-70E740481C1C}">
@@ -10573,14 +12053,13 @@
               </a:ext>
             </a:extLst>
           </a:blip>
-          <a:stretch>
-            <a:fillRect/>
-          </a:stretch>
+          <a:srcRect t="4851"/>
+          <a:stretch/>
         </p:blipFill>
         <p:spPr>
           <a:xfrm>
-            <a:off x="1122716" y="2532772"/>
-            <a:ext cx="9946567" cy="4352144"/>
+            <a:off x="436481" y="2551840"/>
+            <a:ext cx="11403316" cy="4274749"/>
           </a:xfrm>
           <a:prstGeom prst="rect">
             <a:avLst/>
@@ -10590,7 +12069,7 @@
     </p:spTree>
     <p:extLst>
       <p:ext uri="{BB962C8B-B14F-4D97-AF65-F5344CB8AC3E}">
-        <p14:creationId xmlns:p14="http://schemas.microsoft.com/office/powerpoint/2010/main" val="1717381675"/>
+        <p14:creationId xmlns:p14="http://schemas.microsoft.com/office/powerpoint/2010/main" val="446297921"/>
       </p:ext>
     </p:extLst>
   </p:cSld>
@@ -10802,8 +12281,8 @@
         </p:nvSpPr>
         <p:spPr>
           <a:xfrm>
-            <a:off x="9017053" y="1409782"/>
-            <a:ext cx="1297248" cy="634152"/>
+            <a:off x="7509265" y="1326721"/>
+            <a:ext cx="1206925" cy="634152"/>
           </a:xfrm>
         </p:spPr>
         <p:txBody>
@@ -10813,7 +12292,7 @@
           <a:lstStyle/>
           <a:p>
             <a:r>
-              <a:rPr lang="pt-BR" sz="3300" i="1" dirty="0"/>
+              <a:rPr lang="pt-BR" sz="3200" i="1" dirty="0"/>
               <a:t>Nível 3</a:t>
             </a:r>
             <a:br>
@@ -11044,14 +12523,11 @@
               <a:buNone/>
             </a:pPr>
             <a:r>
-              <a:rPr lang="pt-BR" sz="3200" b="1" i="1" dirty="0">
+              <a:rPr lang="pt-BR" sz="3000" b="1" i="1" dirty="0">
                 <a:latin typeface="+mj-lt"/>
               </a:rPr>
               <a:t>Fluxograma de requisição e incidente</a:t>
             </a:r>
-            <a:endParaRPr lang="pt-BR" sz="1800" b="1" i="1" dirty="0">
-              <a:latin typeface="+mj-lt"/>
-            </a:endParaRPr>
           </a:p>
         </p:txBody>
       </p:sp>
@@ -11123,7 +12599,7 @@
         </p:nvCxnSpPr>
         <p:spPr>
           <a:xfrm>
-            <a:off x="7609490" y="819807"/>
+            <a:off x="6863042" y="870861"/>
             <a:ext cx="0" cy="1181657"/>
           </a:xfrm>
           <a:prstGeom prst="line">
@@ -11150,12 +12626,111 @@
           </a:fontRef>
         </p:style>
       </p:cxnSp>
+      <p:sp>
+        <p:nvSpPr>
+          <p:cNvPr id="7" name="Título 1">
+            <a:extLst>
+              <a:ext uri="{FF2B5EF4-FFF2-40B4-BE49-F238E27FC236}">
+                <a16:creationId xmlns:a16="http://schemas.microsoft.com/office/drawing/2014/main" id="{90012830-BDEF-E3E7-56D1-092BFB9D3A04}"/>
+              </a:ext>
+            </a:extLst>
+          </p:cNvPr>
+          <p:cNvSpPr txBox="1">
+            <a:spLocks/>
+          </p:cNvSpPr>
+          <p:nvPr/>
+        </p:nvSpPr>
+        <p:spPr>
+          <a:xfrm>
+            <a:off x="9994244" y="1326721"/>
+            <a:ext cx="1036526" cy="634152"/>
+          </a:xfrm>
+          <a:prstGeom prst="rect">
+            <a:avLst/>
+          </a:prstGeom>
+        </p:spPr>
+        <p:txBody>
+          <a:bodyPr vert="horz" lIns="91440" tIns="45720" rIns="91440" bIns="45720" rtlCol="0" anchor="ctr">
+            <a:normAutofit fontScale="82500" lnSpcReduction="20000"/>
+          </a:bodyPr>
+          <a:lstStyle>
+            <a:lvl1pPr algn="l" defTabSz="914400" rtl="0" eaLnBrk="1" latinLnBrk="0" hangingPunct="1">
+              <a:lnSpc>
+                <a:spcPct val="90000"/>
+              </a:lnSpc>
+              <a:spcBef>
+                <a:spcPct val="0"/>
+              </a:spcBef>
+              <a:buNone/>
+              <a:defRPr sz="4400" kern="1200">
+                <a:solidFill>
+                  <a:schemeClr val="tx1"/>
+                </a:solidFill>
+                <a:latin typeface="+mj-lt"/>
+                <a:ea typeface="+mj-ea"/>
+                <a:cs typeface="+mj-cs"/>
+              </a:defRPr>
+            </a:lvl1pPr>
+          </a:lstStyle>
+          <a:p>
+            <a:r>
+              <a:rPr lang="pt-BR" sz="3100" i="1" dirty="0"/>
+              <a:t>Raia 4</a:t>
+            </a:r>
+            <a:br>
+              <a:rPr lang="pt-BR" sz="2800" dirty="0"/>
+            </a:br>
+            <a:endParaRPr lang="pt-BR" sz="2800" dirty="0"/>
+          </a:p>
+        </p:txBody>
+      </p:sp>
+      <p:cxnSp>
+        <p:nvCxnSpPr>
+          <p:cNvPr id="8" name="Conector reto 7">
+            <a:extLst>
+              <a:ext uri="{FF2B5EF4-FFF2-40B4-BE49-F238E27FC236}">
+                <a16:creationId xmlns:a16="http://schemas.microsoft.com/office/drawing/2014/main" id="{3F9F69C9-2EF7-A431-4F3C-2FFFD395052B}"/>
+              </a:ext>
+            </a:extLst>
+          </p:cNvPr>
+          <p:cNvCxnSpPr/>
+          <p:nvPr/>
+        </p:nvCxnSpPr>
+        <p:spPr>
+          <a:xfrm>
+            <a:off x="9344984" y="830698"/>
+            <a:ext cx="0" cy="1181657"/>
+          </a:xfrm>
+          <a:prstGeom prst="line">
+            <a:avLst/>
+          </a:prstGeom>
+          <a:ln w="12700">
+            <a:solidFill>
+              <a:srgbClr val="FFC000"/>
+            </a:solidFill>
+          </a:ln>
+        </p:spPr>
+        <p:style>
+          <a:lnRef idx="1">
+            <a:schemeClr val="accent1"/>
+          </a:lnRef>
+          <a:fillRef idx="0">
+            <a:schemeClr val="accent1"/>
+          </a:fillRef>
+          <a:effectRef idx="0">
+            <a:schemeClr val="accent1"/>
+          </a:effectRef>
+          <a:fontRef idx="minor">
+            <a:schemeClr val="tx1"/>
+          </a:fontRef>
+        </p:style>
+      </p:cxnSp>
       <p:pic>
         <p:nvPicPr>
-          <p:cNvPr id="4" name="Imagem 3" descr="Diagrama&#10;&#10;Descrição gerada automaticamente">
-            <a:extLst>
-              <a:ext uri="{FF2B5EF4-FFF2-40B4-BE49-F238E27FC236}">
-                <a16:creationId xmlns:a16="http://schemas.microsoft.com/office/drawing/2014/main" id="{62052CED-7816-33C1-F07B-A8D32113FE2D}"/>
+          <p:cNvPr id="5" name="Imagem 4" descr="Diagrama&#10;&#10;Descrição gerada automaticamente">
+            <a:extLst>
+              <a:ext uri="{FF2B5EF4-FFF2-40B4-BE49-F238E27FC236}">
+                <a16:creationId xmlns:a16="http://schemas.microsoft.com/office/drawing/2014/main" id="{B5B5ACDC-15F2-57E8-6A16-62BBF2377F1F}"/>
               </a:ext>
             </a:extLst>
           </p:cNvPr>
@@ -11172,13 +12747,13 @@
               </a:ext>
             </a:extLst>
           </a:blip>
-          <a:srcRect t="4548" b="8849"/>
+          <a:srcRect t="7544"/>
           <a:stretch/>
         </p:blipFill>
         <p:spPr>
           <a:xfrm>
-            <a:off x="1122020" y="2551840"/>
-            <a:ext cx="9947960" cy="4109091"/>
+            <a:off x="256088" y="2516781"/>
+            <a:ext cx="11679824" cy="4244056"/>
           </a:xfrm>
           <a:prstGeom prst="rect">
             <a:avLst/>
@@ -11188,7 +12763,7 @@
     </p:spTree>
     <p:extLst>
       <p:ext uri="{BB962C8B-B14F-4D97-AF65-F5344CB8AC3E}">
-        <p14:creationId xmlns:p14="http://schemas.microsoft.com/office/powerpoint/2010/main" val="1067804848"/>
+        <p14:creationId xmlns:p14="http://schemas.microsoft.com/office/powerpoint/2010/main" val="1987642411"/>
       </p:ext>
     </p:extLst>
   </p:cSld>
@@ -11283,7 +12858,7 @@
         </p:nvSpPr>
         <p:spPr>
           <a:xfrm>
-            <a:off x="152673" y="1240044"/>
+            <a:off x="524802" y="841567"/>
             <a:ext cx="3454924" cy="729526"/>
           </a:xfrm>
           <a:prstGeom prst="rect">
@@ -11459,6 +13034,7 @@
             </a:lvl9pPr>
           </a:lstStyle>
           <a:p>
+            <a:pPr algn="l"/>
             <a:r>
               <a:rPr lang="pt-BR" sz="3000" dirty="0"/>
               <a:t>Fluxograma de problemas</a:t>
@@ -11520,10 +13096,10 @@
       </p:sp>
       <p:pic>
         <p:nvPicPr>
-          <p:cNvPr id="4" name="Espaço Reservado para Conteúdo 4" descr="Diagrama&#10;&#10;Descrição gerada automaticamente">
-            <a:extLst>
-              <a:ext uri="{FF2B5EF4-FFF2-40B4-BE49-F238E27FC236}">
-                <a16:creationId xmlns:a16="http://schemas.microsoft.com/office/drawing/2014/main" id="{8C0BFE75-EA9F-8B77-5016-65F9A606332F}"/>
+          <p:cNvPr id="5" name="Imagem 4">
+            <a:extLst>
+              <a:ext uri="{FF2B5EF4-FFF2-40B4-BE49-F238E27FC236}">
+                <a16:creationId xmlns:a16="http://schemas.microsoft.com/office/drawing/2014/main" id="{E2E5845C-768D-ECD9-E3C5-04E012357F12}"/>
               </a:ext>
             </a:extLst>
           </p:cNvPr>
@@ -11546,8 +13122,8 @@
         </p:blipFill>
         <p:spPr>
           <a:xfrm>
-            <a:off x="3457903" y="19475"/>
-            <a:ext cx="8295677" cy="6838525"/>
+            <a:off x="3284375" y="64816"/>
+            <a:ext cx="8587893" cy="6728367"/>
           </a:xfrm>
           <a:prstGeom prst="rect">
             <a:avLst/>

</xml_diff>